<commit_message>
adds limit and offset to demo
</commit_message>
<xml_diff>
--- a/7 - databases one/Part 1 - Introduction to the Relational Model.pptx
+++ b/7 - databases one/Part 1 - Introduction to the Relational Model.pptx
@@ -5,7 +5,7 @@
     <p:sldMasterId id="2147483648" r:id="rId1"/>
   </p:sldMasterIdLst>
   <p:notesMasterIdLst>
-    <p:notesMasterId r:id="rId23"/>
+    <p:notesMasterId r:id="rId24"/>
   </p:notesMasterIdLst>
   <p:sldIdLst>
     <p:sldId id="452" r:id="rId2"/>
@@ -15,20 +15,21 @@
     <p:sldId id="397" r:id="rId6"/>
     <p:sldId id="451" r:id="rId7"/>
     <p:sldId id="455" r:id="rId8"/>
-    <p:sldId id="401" r:id="rId9"/>
-    <p:sldId id="409" r:id="rId10"/>
-    <p:sldId id="410" r:id="rId11"/>
-    <p:sldId id="411" r:id="rId12"/>
-    <p:sldId id="396" r:id="rId13"/>
-    <p:sldId id="425" r:id="rId14"/>
-    <p:sldId id="432" r:id="rId15"/>
-    <p:sldId id="413" r:id="rId16"/>
-    <p:sldId id="391" r:id="rId17"/>
-    <p:sldId id="415" r:id="rId18"/>
-    <p:sldId id="416" r:id="rId19"/>
-    <p:sldId id="426" r:id="rId20"/>
-    <p:sldId id="427" r:id="rId21"/>
-    <p:sldId id="454" r:id="rId22"/>
+    <p:sldId id="456" r:id="rId9"/>
+    <p:sldId id="401" r:id="rId10"/>
+    <p:sldId id="409" r:id="rId11"/>
+    <p:sldId id="410" r:id="rId12"/>
+    <p:sldId id="411" r:id="rId13"/>
+    <p:sldId id="396" r:id="rId14"/>
+    <p:sldId id="425" r:id="rId15"/>
+    <p:sldId id="432" r:id="rId16"/>
+    <p:sldId id="413" r:id="rId17"/>
+    <p:sldId id="391" r:id="rId18"/>
+    <p:sldId id="415" r:id="rId19"/>
+    <p:sldId id="416" r:id="rId20"/>
+    <p:sldId id="426" r:id="rId21"/>
+    <p:sldId id="427" r:id="rId22"/>
+    <p:sldId id="454" r:id="rId23"/>
   </p:sldIdLst>
   <p:sldSz cx="12192000" cy="6858000"/>
   <p:notesSz cx="6858000" cy="9144000"/>
@@ -788,7 +789,7 @@
                 <a:buFont typeface="Monotype Sorts" pitchFamily="2" charset="2"/>
                 <a:buNone/>
               </a:pPr>
-              <a:t>16</a:t>
+              <a:t>17</a:t>
             </a:fld>
             <a:endParaRPr lang="en-US" altLang="en-US" sz="1200">
               <a:latin typeface="Tahoma" panose="020B0604030504040204" pitchFamily="34" charset="0"/>
@@ -2068,7 +2069,7 @@
                 <a:buFont typeface="Monotype Sorts" pitchFamily="2" charset="2"/>
                 <a:buNone/>
               </a:pPr>
-              <a:t>8</a:t>
+              <a:t>9</a:t>
             </a:fld>
             <a:endParaRPr lang="en-US" altLang="en-US" sz="1200">
               <a:latin typeface="Tahoma" panose="020B0604030504040204" pitchFamily="34" charset="0"/>
@@ -2372,7 +2373,7 @@
                 <a:buFont typeface="Monotype Sorts" pitchFamily="2" charset="2"/>
                 <a:buNone/>
               </a:pPr>
-              <a:t>12</a:t>
+              <a:t>13</a:t>
             </a:fld>
             <a:endParaRPr lang="en-US" altLang="en-US"/>
           </a:p>
@@ -2667,7 +2668,7 @@
                 <a:buFont typeface="Monotype Sorts" pitchFamily="2" charset="2"/>
                 <a:buNone/>
               </a:pPr>
-              <a:t>13</a:t>
+              <a:t>14</a:t>
             </a:fld>
             <a:endParaRPr lang="en-US" altLang="en-US"/>
           </a:p>
@@ -2959,7 +2960,7 @@
                 <a:buFont typeface="Monotype Sorts" pitchFamily="2" charset="2"/>
                 <a:buNone/>
               </a:pPr>
-              <a:t>14</a:t>
+              <a:t>15</a:t>
             </a:fld>
             <a:endParaRPr lang="en-US" altLang="en-US"/>
           </a:p>
@@ -3253,7 +3254,7 @@
                 <a:buFont typeface="Monotype Sorts" pitchFamily="2" charset="2"/>
                 <a:buNone/>
               </a:pPr>
-              <a:t>15</a:t>
+              <a:t>16</a:t>
             </a:fld>
             <a:endParaRPr lang="en-US" altLang="en-US" sz="1200">
               <a:latin typeface="Tahoma" panose="020B0604030504040204" pitchFamily="34" charset="0"/>
@@ -7270,6 +7271,529 @@
       </p:grpSpPr>
       <p:sp>
         <p:nvSpPr>
+          <p:cNvPr id="35841" name="Rectangle 2">
+            <a:extLst>
+              <a:ext uri="{FF2B5EF4-FFF2-40B4-BE49-F238E27FC236}">
+                <a16:creationId xmlns:a16="http://schemas.microsoft.com/office/drawing/2014/main" id="{07F80B2D-8960-1D43-84A6-E27E8D02F02D}"/>
+              </a:ext>
+            </a:extLst>
+          </p:cNvPr>
+          <p:cNvSpPr>
+            <a:spLocks noGrp="1" noChangeArrowheads="1"/>
+          </p:cNvSpPr>
+          <p:nvPr>
+            <p:ph type="title"/>
+          </p:nvPr>
+        </p:nvSpPr>
+        <p:spPr/>
+        <p:txBody>
+          <a:bodyPr>
+            <a:normAutofit/>
+          </a:bodyPr>
+          <a:lstStyle/>
+          <a:p>
+            <a:pPr eaLnBrk="1" hangingPunct="1"/>
+            <a:r>
+              <a:rPr lang="en-US" altLang="en-US" dirty="0">
+                <a:ea typeface="ＭＳ Ｐゴシック" panose="020B0600070205080204" pitchFamily="34" charset="-128"/>
+              </a:rPr>
+              <a:t>Integrity Constraints (ICs)</a:t>
+            </a:r>
+          </a:p>
+        </p:txBody>
+      </p:sp>
+      <p:sp>
+        <p:nvSpPr>
+          <p:cNvPr id="25605" name="Rectangle 3">
+            <a:extLst>
+              <a:ext uri="{FF2B5EF4-FFF2-40B4-BE49-F238E27FC236}">
+                <a16:creationId xmlns:a16="http://schemas.microsoft.com/office/drawing/2014/main" id="{78373FFB-248B-014C-A153-967951A94F97}"/>
+              </a:ext>
+            </a:extLst>
+          </p:cNvPr>
+          <p:cNvSpPr>
+            <a:spLocks noGrp="1" noChangeArrowheads="1"/>
+          </p:cNvSpPr>
+          <p:nvPr>
+            <p:ph type="body" idx="1"/>
+          </p:nvPr>
+        </p:nvSpPr>
+        <p:spPr>
+          <a:xfrm>
+            <a:off x="1905000" y="1605516"/>
+            <a:ext cx="8229600" cy="4114800"/>
+          </a:xfrm>
+        </p:spPr>
+        <p:txBody>
+          <a:bodyPr/>
+          <a:lstStyle/>
+          <a:p>
+            <a:pPr eaLnBrk="1" hangingPunct="1"/>
+            <a:r>
+              <a:rPr lang="en-US" altLang="en-US" b="1" dirty="0">
+                <a:latin typeface="Arial" panose="020B0604020202020204" pitchFamily="34" charset="0"/>
+                <a:ea typeface="ＭＳ Ｐゴシック" panose="020B0600070205080204" pitchFamily="34" charset="-128"/>
+              </a:rPr>
+              <a:t>IC</a:t>
+            </a:r>
+            <a:r>
+              <a:rPr lang="en-US" altLang="en-US" dirty="0">
+                <a:latin typeface="Arial" panose="020B0604020202020204" pitchFamily="34" charset="0"/>
+                <a:ea typeface="ＭＳ Ｐゴシック" panose="020B0600070205080204" pitchFamily="34" charset="-128"/>
+              </a:rPr>
+              <a:t>: condition that must be true for </a:t>
+            </a:r>
+            <a:r>
+              <a:rPr lang="en-US" altLang="en-US" i="1" dirty="0">
+                <a:latin typeface="Arial" panose="020B0604020202020204" pitchFamily="34" charset="0"/>
+                <a:ea typeface="ＭＳ Ｐゴシック" panose="020B0600070205080204" pitchFamily="34" charset="-128"/>
+              </a:rPr>
+              <a:t>any </a:t>
+            </a:r>
+            <a:r>
+              <a:rPr lang="en-US" altLang="en-US" dirty="0">
+                <a:latin typeface="Arial" panose="020B0604020202020204" pitchFamily="34" charset="0"/>
+                <a:ea typeface="ＭＳ Ｐゴシック" panose="020B0600070205080204" pitchFamily="34" charset="-128"/>
+              </a:rPr>
+              <a:t>instance of the database (e.g., domain constraints)</a:t>
+            </a:r>
+          </a:p>
+          <a:p>
+            <a:pPr lvl="1" eaLnBrk="1" hangingPunct="1">
+              <a:lnSpc>
+                <a:spcPct val="120000"/>
+              </a:lnSpc>
+            </a:pPr>
+            <a:r>
+              <a:rPr lang="en-US" altLang="en-US" dirty="0">
+                <a:latin typeface="Arial" panose="020B0604020202020204" pitchFamily="34" charset="0"/>
+                <a:ea typeface="ＭＳ Ｐゴシック" panose="020B0600070205080204" pitchFamily="34" charset="-128"/>
+              </a:rPr>
+              <a:t>A </a:t>
+            </a:r>
+            <a:r>
+              <a:rPr lang="en-US" altLang="en-US" b="1" dirty="0">
+                <a:latin typeface="Arial" panose="020B0604020202020204" pitchFamily="34" charset="0"/>
+                <a:ea typeface="ＭＳ Ｐゴシック" panose="020B0600070205080204" pitchFamily="34" charset="-128"/>
+              </a:rPr>
+              <a:t>legal</a:t>
+            </a:r>
+            <a:r>
+              <a:rPr lang="en-US" altLang="en-US" i="1" dirty="0">
+                <a:latin typeface="Arial" panose="020B0604020202020204" pitchFamily="34" charset="0"/>
+                <a:ea typeface="ＭＳ Ｐゴシック" panose="020B0600070205080204" pitchFamily="34" charset="-128"/>
+              </a:rPr>
+              <a:t> </a:t>
+            </a:r>
+            <a:r>
+              <a:rPr lang="en-US" altLang="en-US" dirty="0">
+                <a:latin typeface="Arial" panose="020B0604020202020204" pitchFamily="34" charset="0"/>
+                <a:ea typeface="ＭＳ Ｐゴシック" panose="020B0600070205080204" pitchFamily="34" charset="-128"/>
+              </a:rPr>
+              <a:t>instance of a relation is one that satisfies all specified ICs</a:t>
+            </a:r>
+          </a:p>
+          <a:p>
+            <a:pPr lvl="1" eaLnBrk="1" hangingPunct="1">
+              <a:lnSpc>
+                <a:spcPct val="120000"/>
+              </a:lnSpc>
+            </a:pPr>
+            <a:r>
+              <a:rPr lang="en-US" altLang="en-US" dirty="0">
+                <a:latin typeface="Arial" panose="020B0604020202020204" pitchFamily="34" charset="0"/>
+                <a:ea typeface="ＭＳ Ｐゴシック" panose="020B0600070205080204" pitchFamily="34" charset="-128"/>
+              </a:rPr>
+              <a:t>ICs are </a:t>
+            </a:r>
+            <a:r>
+              <a:rPr lang="en-US" altLang="en-US" u="sng" dirty="0">
+                <a:latin typeface="Arial" panose="020B0604020202020204" pitchFamily="34" charset="0"/>
+                <a:ea typeface="ＭＳ Ｐゴシック" panose="020B0600070205080204" pitchFamily="34" charset="-128"/>
+              </a:rPr>
+              <a:t>specified </a:t>
+            </a:r>
+            <a:r>
+              <a:rPr lang="en-US" altLang="en-US" dirty="0">
+                <a:latin typeface="Arial" panose="020B0604020202020204" pitchFamily="34" charset="0"/>
+                <a:ea typeface="ＭＳ Ｐゴシック" panose="020B0600070205080204" pitchFamily="34" charset="-128"/>
+              </a:rPr>
+              <a:t>when schema is </a:t>
+            </a:r>
+            <a:r>
+              <a:rPr lang="en-US" altLang="en-US" b="1" dirty="0">
+                <a:latin typeface="Arial" panose="020B0604020202020204" pitchFamily="34" charset="0"/>
+                <a:ea typeface="ＭＳ Ｐゴシック" panose="020B0600070205080204" pitchFamily="34" charset="-128"/>
+              </a:rPr>
+              <a:t>defined</a:t>
+            </a:r>
+          </a:p>
+          <a:p>
+            <a:pPr lvl="1" eaLnBrk="1" hangingPunct="1">
+              <a:lnSpc>
+                <a:spcPct val="120000"/>
+              </a:lnSpc>
+            </a:pPr>
+            <a:r>
+              <a:rPr lang="en-US" altLang="en-US" dirty="0">
+                <a:latin typeface="Arial" panose="020B0604020202020204" pitchFamily="34" charset="0"/>
+                <a:ea typeface="ＭＳ Ｐゴシック" panose="020B0600070205080204" pitchFamily="34" charset="-128"/>
+              </a:rPr>
+              <a:t>ICs are </a:t>
+            </a:r>
+            <a:r>
+              <a:rPr lang="en-US" altLang="en-US" u="sng" dirty="0">
+                <a:latin typeface="Arial" panose="020B0604020202020204" pitchFamily="34" charset="0"/>
+                <a:ea typeface="ＭＳ Ｐゴシック" panose="020B0600070205080204" pitchFamily="34" charset="-128"/>
+              </a:rPr>
+              <a:t>enforced </a:t>
+            </a:r>
+            <a:r>
+              <a:rPr lang="en-US" altLang="en-US" dirty="0">
+                <a:latin typeface="Arial" panose="020B0604020202020204" pitchFamily="34" charset="0"/>
+                <a:ea typeface="ＭＳ Ｐゴシック" panose="020B0600070205080204" pitchFamily="34" charset="-128"/>
+              </a:rPr>
+              <a:t>when tables are </a:t>
+            </a:r>
+            <a:r>
+              <a:rPr lang="en-US" altLang="en-US" b="1" dirty="0">
+                <a:latin typeface="Arial" panose="020B0604020202020204" pitchFamily="34" charset="0"/>
+                <a:ea typeface="ＭＳ Ｐゴシック" panose="020B0600070205080204" pitchFamily="34" charset="-128"/>
+              </a:rPr>
+              <a:t>modified</a:t>
+            </a:r>
+          </a:p>
+          <a:p>
+            <a:pPr lvl="1" eaLnBrk="1" hangingPunct="1"/>
+            <a:endParaRPr lang="en-US" altLang="en-US" dirty="0">
+              <a:latin typeface="Arial" panose="020B0604020202020204" pitchFamily="34" charset="0"/>
+              <a:ea typeface="ＭＳ Ｐゴシック" panose="020B0600070205080204" pitchFamily="34" charset="-128"/>
+            </a:endParaRPr>
+          </a:p>
+        </p:txBody>
+      </p:sp>
+      <p:pic>
+        <p:nvPicPr>
+          <p:cNvPr id="35843" name="Picture 6">
+            <a:extLst>
+              <a:ext uri="{FF2B5EF4-FFF2-40B4-BE49-F238E27FC236}">
+                <a16:creationId xmlns:a16="http://schemas.microsoft.com/office/drawing/2014/main" id="{95D39001-AF97-6D40-A735-F9539DA2EDDA}"/>
+              </a:ext>
+            </a:extLst>
+          </p:cNvPr>
+          <p:cNvPicPr>
+            <a:picLocks noChangeAspect="1"/>
+          </p:cNvPicPr>
+          <p:nvPr/>
+        </p:nvPicPr>
+        <p:blipFill>
+          <a:blip r:embed="rId2">
+            <a:extLst>
+              <a:ext uri="{28A0092B-C50C-407E-A947-70E740481C1C}">
+                <a14:useLocalDpi xmlns:a14="http://schemas.microsoft.com/office/drawing/2010/main" val="0"/>
+              </a:ext>
+            </a:extLst>
+          </a:blip>
+          <a:srcRect/>
+          <a:stretch>
+            <a:fillRect/>
+          </a:stretch>
+        </p:blipFill>
+        <p:spPr bwMode="auto">
+          <a:xfrm>
+            <a:off x="7421564" y="4729716"/>
+            <a:ext cx="2865437" cy="1524000"/>
+          </a:xfrm>
+          <a:prstGeom prst="rect">
+            <a:avLst/>
+          </a:prstGeom>
+          <a:noFill/>
+          <a:ln>
+            <a:noFill/>
+          </a:ln>
+          <a:extLst>
+            <a:ext uri="{909E8E84-426E-40DD-AFC4-6F175D3DCCD1}">
+              <a14:hiddenFill xmlns:a14="http://schemas.microsoft.com/office/drawing/2010/main">
+                <a:solidFill>
+                  <a:srgbClr val="FFFFFF"/>
+                </a:solidFill>
+              </a14:hiddenFill>
+            </a:ext>
+            <a:ext uri="{91240B29-F687-4F45-9708-019B960494DF}">
+              <a14:hiddenLine xmlns:a14="http://schemas.microsoft.com/office/drawing/2010/main" w="9525">
+                <a:solidFill>
+                  <a:srgbClr val="000000"/>
+                </a:solidFill>
+                <a:miter lim="800000"/>
+                <a:headEnd/>
+                <a:tailEnd/>
+              </a14:hiddenLine>
+            </a:ext>
+          </a:extLst>
+        </p:spPr>
+      </p:pic>
+    </p:spTree>
+    <p:extLst>
+      <p:ext uri="{BB962C8B-B14F-4D97-AF65-F5344CB8AC3E}">
+        <p14:creationId xmlns:p14="http://schemas.microsoft.com/office/powerpoint/2010/main" val="3686999695"/>
+      </p:ext>
+    </p:extLst>
+  </p:cSld>
+  <p:clrMapOvr>
+    <a:masterClrMapping/>
+  </p:clrMapOvr>
+  <p:transition spd="slow"/>
+  <p:timing>
+    <p:tnLst>
+      <p:par>
+        <p:cTn id="1" dur="indefinite" restart="never" nodeType="tmRoot">
+          <p:childTnLst>
+            <p:seq concurrent="1" nextAc="seek">
+              <p:cTn id="2" dur="indefinite" nodeType="mainSeq">
+                <p:childTnLst>
+                  <p:par>
+                    <p:cTn id="3" fill="hold" nodeType="clickPar">
+                      <p:stCondLst>
+                        <p:cond delay="indefinite"/>
+                      </p:stCondLst>
+                      <p:childTnLst>
+                        <p:par>
+                          <p:cTn id="4" fill="hold" nodeType="withGroup">
+                            <p:stCondLst>
+                              <p:cond delay="0"/>
+                            </p:stCondLst>
+                            <p:childTnLst>
+                              <p:par>
+                                <p:cTn id="5" presetID="1" presetClass="entr" presetSubtype="0" fill="hold" grpId="0" nodeType="clickEffect">
+                                  <p:stCondLst>
+                                    <p:cond delay="0"/>
+                                  </p:stCondLst>
+                                  <p:childTnLst>
+                                    <p:set>
+                                      <p:cBhvr>
+                                        <p:cTn id="6" dur="1" fill="hold">
+                                          <p:stCondLst>
+                                            <p:cond delay="0"/>
+                                          </p:stCondLst>
+                                        </p:cTn>
+                                        <p:tgtEl>
+                                          <p:spTgt spid="25605">
+                                            <p:txEl>
+                                              <p:pRg st="0" end="0"/>
+                                            </p:txEl>
+                                          </p:spTgt>
+                                        </p:tgtEl>
+                                        <p:attrNameLst>
+                                          <p:attrName>style.visibility</p:attrName>
+                                        </p:attrNameLst>
+                                      </p:cBhvr>
+                                      <p:to>
+                                        <p:strVal val="visible"/>
+                                      </p:to>
+                                    </p:set>
+                                  </p:childTnLst>
+                                </p:cTn>
+                              </p:par>
+                            </p:childTnLst>
+                          </p:cTn>
+                        </p:par>
+                      </p:childTnLst>
+                    </p:cTn>
+                  </p:par>
+                  <p:par>
+                    <p:cTn id="7" fill="hold" nodeType="clickPar">
+                      <p:stCondLst>
+                        <p:cond delay="indefinite"/>
+                      </p:stCondLst>
+                      <p:childTnLst>
+                        <p:par>
+                          <p:cTn id="8" fill="hold" nodeType="withGroup">
+                            <p:stCondLst>
+                              <p:cond delay="0"/>
+                            </p:stCondLst>
+                            <p:childTnLst>
+                              <p:par>
+                                <p:cTn id="9" presetID="1" presetClass="entr" presetSubtype="0" fill="hold" grpId="0" nodeType="clickEffect">
+                                  <p:stCondLst>
+                                    <p:cond delay="0"/>
+                                  </p:stCondLst>
+                                  <p:childTnLst>
+                                    <p:set>
+                                      <p:cBhvr>
+                                        <p:cTn id="10" dur="1" fill="hold">
+                                          <p:stCondLst>
+                                            <p:cond delay="0"/>
+                                          </p:stCondLst>
+                                        </p:cTn>
+                                        <p:tgtEl>
+                                          <p:spTgt spid="25605">
+                                            <p:txEl>
+                                              <p:pRg st="1" end="1"/>
+                                            </p:txEl>
+                                          </p:spTgt>
+                                        </p:tgtEl>
+                                        <p:attrNameLst>
+                                          <p:attrName>style.visibility</p:attrName>
+                                        </p:attrNameLst>
+                                      </p:cBhvr>
+                                      <p:to>
+                                        <p:strVal val="visible"/>
+                                      </p:to>
+                                    </p:set>
+                                  </p:childTnLst>
+                                </p:cTn>
+                              </p:par>
+                            </p:childTnLst>
+                          </p:cTn>
+                        </p:par>
+                      </p:childTnLst>
+                    </p:cTn>
+                  </p:par>
+                  <p:par>
+                    <p:cTn id="11" fill="hold" nodeType="clickPar">
+                      <p:stCondLst>
+                        <p:cond delay="indefinite"/>
+                      </p:stCondLst>
+                      <p:childTnLst>
+                        <p:par>
+                          <p:cTn id="12" fill="hold" nodeType="withGroup">
+                            <p:stCondLst>
+                              <p:cond delay="0"/>
+                            </p:stCondLst>
+                            <p:childTnLst>
+                              <p:par>
+                                <p:cTn id="13" presetID="1" presetClass="entr" presetSubtype="0" fill="hold" grpId="0" nodeType="clickEffect">
+                                  <p:stCondLst>
+                                    <p:cond delay="0"/>
+                                  </p:stCondLst>
+                                  <p:childTnLst>
+                                    <p:set>
+                                      <p:cBhvr>
+                                        <p:cTn id="14" dur="1" fill="hold">
+                                          <p:stCondLst>
+                                            <p:cond delay="0"/>
+                                          </p:stCondLst>
+                                        </p:cTn>
+                                        <p:tgtEl>
+                                          <p:spTgt spid="25605">
+                                            <p:txEl>
+                                              <p:pRg st="2" end="2"/>
+                                            </p:txEl>
+                                          </p:spTgt>
+                                        </p:tgtEl>
+                                        <p:attrNameLst>
+                                          <p:attrName>style.visibility</p:attrName>
+                                        </p:attrNameLst>
+                                      </p:cBhvr>
+                                      <p:to>
+                                        <p:strVal val="visible"/>
+                                      </p:to>
+                                    </p:set>
+                                  </p:childTnLst>
+                                </p:cTn>
+                              </p:par>
+                            </p:childTnLst>
+                          </p:cTn>
+                        </p:par>
+                      </p:childTnLst>
+                    </p:cTn>
+                  </p:par>
+                  <p:par>
+                    <p:cTn id="15" fill="hold" nodeType="clickPar">
+                      <p:stCondLst>
+                        <p:cond delay="indefinite"/>
+                      </p:stCondLst>
+                      <p:childTnLst>
+                        <p:par>
+                          <p:cTn id="16" fill="hold" nodeType="withGroup">
+                            <p:stCondLst>
+                              <p:cond delay="0"/>
+                            </p:stCondLst>
+                            <p:childTnLst>
+                              <p:par>
+                                <p:cTn id="17" presetID="1" presetClass="entr" presetSubtype="0" fill="hold" grpId="0" nodeType="clickEffect">
+                                  <p:stCondLst>
+                                    <p:cond delay="0"/>
+                                  </p:stCondLst>
+                                  <p:childTnLst>
+                                    <p:set>
+                                      <p:cBhvr>
+                                        <p:cTn id="18" dur="1" fill="hold">
+                                          <p:stCondLst>
+                                            <p:cond delay="0"/>
+                                          </p:stCondLst>
+                                        </p:cTn>
+                                        <p:tgtEl>
+                                          <p:spTgt spid="25605">
+                                            <p:txEl>
+                                              <p:pRg st="3" end="3"/>
+                                            </p:txEl>
+                                          </p:spTgt>
+                                        </p:tgtEl>
+                                        <p:attrNameLst>
+                                          <p:attrName>style.visibility</p:attrName>
+                                        </p:attrNameLst>
+                                      </p:cBhvr>
+                                      <p:to>
+                                        <p:strVal val="visible"/>
+                                      </p:to>
+                                    </p:set>
+                                  </p:childTnLst>
+                                </p:cTn>
+                              </p:par>
+                            </p:childTnLst>
+                          </p:cTn>
+                        </p:par>
+                      </p:childTnLst>
+                    </p:cTn>
+                  </p:par>
+                </p:childTnLst>
+              </p:cTn>
+              <p:prevCondLst>
+                <p:cond evt="onPrev" delay="0">
+                  <p:tgtEl>
+                    <p:sldTgt/>
+                  </p:tgtEl>
+                </p:cond>
+              </p:prevCondLst>
+              <p:nextCondLst>
+                <p:cond evt="onNext" delay="0">
+                  <p:tgtEl>
+                    <p:sldTgt/>
+                  </p:tgtEl>
+                </p:cond>
+              </p:nextCondLst>
+            </p:seq>
+          </p:childTnLst>
+        </p:cTn>
+      </p:par>
+    </p:tnLst>
+    <p:bldLst>
+      <p:bldP spid="25605" grpId="0" build="p" bldLvl="2"/>
+    </p:bldLst>
+  </p:timing>
+</p:sld>
+</file>
+
+<file path=ppt/slides/slide11.xml><?xml version="1.0" encoding="utf-8"?>
+<p:sld xmlns:a="http://schemas.openxmlformats.org/drawingml/2006/main" xmlns:r="http://schemas.openxmlformats.org/officeDocument/2006/relationships" xmlns:p="http://schemas.openxmlformats.org/presentationml/2006/main">
+  <p:cSld>
+    <p:spTree>
+      <p:nvGrpSpPr>
+        <p:cNvPr id="1" name=""/>
+        <p:cNvGrpSpPr/>
+        <p:nvPr/>
+      </p:nvGrpSpPr>
+      <p:grpSpPr>
+        <a:xfrm>
+          <a:off x="0" y="0"/>
+          <a:ext cx="0" cy="0"/>
+          <a:chOff x="0" y="0"/>
+          <a:chExt cx="0" cy="0"/>
+        </a:xfrm>
+      </p:grpSpPr>
+      <p:sp>
+        <p:nvSpPr>
           <p:cNvPr id="36865" name="Rectangle 2">
             <a:extLst>
               <a:ext uri="{FF2B5EF4-FFF2-40B4-BE49-F238E27FC236}">
@@ -7982,7 +8506,7 @@
 </p:sld>
 </file>
 
-<file path=ppt/slides/slide11.xml><?xml version="1.0" encoding="utf-8"?>
+<file path=ppt/slides/slide12.xml><?xml version="1.0" encoding="utf-8"?>
 <p:sld xmlns:a="http://schemas.openxmlformats.org/drawingml/2006/main" xmlns:r="http://schemas.openxmlformats.org/officeDocument/2006/relationships" xmlns:p="http://schemas.openxmlformats.org/presentationml/2006/main">
   <p:cSld>
     <p:spTree>
@@ -10198,7 +10722,7 @@
 </p:sld>
 </file>
 
-<file path=ppt/slides/slide12.xml><?xml version="1.0" encoding="utf-8"?>
+<file path=ppt/slides/slide13.xml><?xml version="1.0" encoding="utf-8"?>
 <p:sld xmlns:a="http://schemas.openxmlformats.org/drawingml/2006/main" xmlns:r="http://schemas.openxmlformats.org/officeDocument/2006/relationships" xmlns:p="http://schemas.openxmlformats.org/presentationml/2006/main">
   <p:cSld>
     <p:spTree>
@@ -10617,7 +11141,7 @@
 </p:sld>
 </file>
 
-<file path=ppt/slides/slide13.xml><?xml version="1.0" encoding="utf-8"?>
+<file path=ppt/slides/slide14.xml><?xml version="1.0" encoding="utf-8"?>
 <p:sld xmlns:a="http://schemas.openxmlformats.org/drawingml/2006/main" xmlns:r="http://schemas.openxmlformats.org/officeDocument/2006/relationships" xmlns:p="http://schemas.openxmlformats.org/presentationml/2006/main">
   <p:cSld>
     <p:spTree>
@@ -11090,7 +11614,7 @@
 </p:sld>
 </file>
 
-<file path=ppt/slides/slide14.xml><?xml version="1.0" encoding="utf-8"?>
+<file path=ppt/slides/slide15.xml><?xml version="1.0" encoding="utf-8"?>
 <p:sld xmlns:a="http://schemas.openxmlformats.org/drawingml/2006/main" xmlns:r="http://schemas.openxmlformats.org/officeDocument/2006/relationships" xmlns:p="http://schemas.openxmlformats.org/presentationml/2006/main">
   <p:cSld>
     <p:spTree>
@@ -11589,7 +12113,7 @@
 </p:sld>
 </file>
 
-<file path=ppt/slides/slide15.xml><?xml version="1.0" encoding="utf-8"?>
+<file path=ppt/slides/slide16.xml><?xml version="1.0" encoding="utf-8"?>
 <p:sld xmlns:a="http://schemas.openxmlformats.org/drawingml/2006/main" xmlns:r="http://schemas.openxmlformats.org/officeDocument/2006/relationships" xmlns:p="http://schemas.openxmlformats.org/presentationml/2006/main" showMasterPhAnim="0">
   <p:cSld>
     <p:spTree>
@@ -14769,7 +15293,7 @@
 </p:sld>
 </file>
 
-<file path=ppt/slides/slide16.xml><?xml version="1.0" encoding="utf-8"?>
+<file path=ppt/slides/slide17.xml><?xml version="1.0" encoding="utf-8"?>
 <p:sld xmlns:a="http://schemas.openxmlformats.org/drawingml/2006/main" xmlns:r="http://schemas.openxmlformats.org/officeDocument/2006/relationships" xmlns:p="http://schemas.openxmlformats.org/presentationml/2006/main" showMasterPhAnim="0">
   <p:cSld>
     <p:spTree>
@@ -19637,7 +20161,7 @@
 </p:sld>
 </file>
 
-<file path=ppt/slides/slide17.xml><?xml version="1.0" encoding="utf-8"?>
+<file path=ppt/slides/slide18.xml><?xml version="1.0" encoding="utf-8"?>
 <p:sld xmlns:a="http://schemas.openxmlformats.org/drawingml/2006/main" xmlns:r="http://schemas.openxmlformats.org/officeDocument/2006/relationships" xmlns:p="http://schemas.openxmlformats.org/presentationml/2006/main">
   <p:cSld>
     <p:spTree>
@@ -24530,7 +25054,7 @@
 </p:sld>
 </file>
 
-<file path=ppt/slides/slide18.xml><?xml version="1.0" encoding="utf-8"?>
+<file path=ppt/slides/slide19.xml><?xml version="1.0" encoding="utf-8"?>
 <p:sld xmlns:a="http://schemas.openxmlformats.org/drawingml/2006/main" xmlns:r="http://schemas.openxmlformats.org/officeDocument/2006/relationships" xmlns:p="http://schemas.openxmlformats.org/presentationml/2006/main">
   <p:cSld>
     <p:spTree>
@@ -24822,7 +25346,534 @@
 </p:sld>
 </file>
 
-<file path=ppt/slides/slide19.xml><?xml version="1.0" encoding="utf-8"?>
+<file path=ppt/slides/slide2.xml><?xml version="1.0" encoding="utf-8"?>
+<p:sld xmlns:a="http://schemas.openxmlformats.org/drawingml/2006/main" xmlns:r="http://schemas.openxmlformats.org/officeDocument/2006/relationships" xmlns:p="http://schemas.openxmlformats.org/presentationml/2006/main">
+  <p:cSld>
+    <p:spTree>
+      <p:nvGrpSpPr>
+        <p:cNvPr id="1" name=""/>
+        <p:cNvGrpSpPr/>
+        <p:nvPr/>
+      </p:nvGrpSpPr>
+      <p:grpSpPr>
+        <a:xfrm>
+          <a:off x="0" y="0"/>
+          <a:ext cx="0" cy="0"/>
+          <a:chOff x="0" y="0"/>
+          <a:chExt cx="0" cy="0"/>
+        </a:xfrm>
+      </p:grpSpPr>
+      <p:sp>
+        <p:nvSpPr>
+          <p:cNvPr id="2" name="Title 1">
+            <a:extLst>
+              <a:ext uri="{FF2B5EF4-FFF2-40B4-BE49-F238E27FC236}">
+                <a16:creationId xmlns:a16="http://schemas.microsoft.com/office/drawing/2014/main" id="{ADF6043B-194E-FF43-9784-7D178CBD4AC5}"/>
+              </a:ext>
+            </a:extLst>
+          </p:cNvPr>
+          <p:cNvSpPr>
+            <a:spLocks noGrp="1"/>
+          </p:cNvSpPr>
+          <p:nvPr>
+            <p:ph type="ctrTitle"/>
+          </p:nvPr>
+        </p:nvSpPr>
+        <p:spPr/>
+        <p:txBody>
+          <a:bodyPr/>
+          <a:lstStyle/>
+          <a:p>
+            <a:endParaRPr lang="en-US"/>
+          </a:p>
+        </p:txBody>
+      </p:sp>
+      <p:sp>
+        <p:nvSpPr>
+          <p:cNvPr id="3" name="Subtitle 2">
+            <a:extLst>
+              <a:ext uri="{FF2B5EF4-FFF2-40B4-BE49-F238E27FC236}">
+                <a16:creationId xmlns:a16="http://schemas.microsoft.com/office/drawing/2014/main" id="{52958691-4213-DE44-A67C-FF2F71F2DC61}"/>
+              </a:ext>
+            </a:extLst>
+          </p:cNvPr>
+          <p:cNvSpPr>
+            <a:spLocks noGrp="1"/>
+          </p:cNvSpPr>
+          <p:nvPr>
+            <p:ph type="subTitle" idx="1"/>
+          </p:nvPr>
+        </p:nvSpPr>
+        <p:spPr/>
+        <p:txBody>
+          <a:bodyPr/>
+          <a:lstStyle/>
+          <a:p>
+            <a:endParaRPr lang="en-US"/>
+          </a:p>
+        </p:txBody>
+      </p:sp>
+      <p:sp>
+        <p:nvSpPr>
+          <p:cNvPr id="4" name="Rectangle 1">
+            <a:extLst>
+              <a:ext uri="{FF2B5EF4-FFF2-40B4-BE49-F238E27FC236}">
+                <a16:creationId xmlns:a16="http://schemas.microsoft.com/office/drawing/2014/main" id="{454280DF-5B84-E247-AE2C-C5A292E8A891}"/>
+              </a:ext>
+            </a:extLst>
+          </p:cNvPr>
+          <p:cNvSpPr>
+            <a:spLocks noChangeArrowheads="1"/>
+          </p:cNvSpPr>
+          <p:nvPr/>
+        </p:nvSpPr>
+        <p:spPr bwMode="auto">
+          <a:xfrm>
+            <a:off x="551419" y="74428"/>
+            <a:ext cx="11089159" cy="8510022"/>
+          </a:xfrm>
+          <a:prstGeom prst="rect">
+            <a:avLst/>
+          </a:prstGeom>
+          <a:noFill/>
+          <a:ln>
+            <a:noFill/>
+          </a:ln>
+          <a:effectLst/>
+          <a:extLst>
+            <a:ext uri="{909E8E84-426E-40DD-AFC4-6F175D3DCCD1}">
+              <a14:hiddenFill xmlns:a14="http://schemas.microsoft.com/office/drawing/2010/main">
+                <a:solidFill>
+                  <a:schemeClr val="accent1"/>
+                </a:solidFill>
+              </a14:hiddenFill>
+            </a:ext>
+            <a:ext uri="{91240B29-F687-4F45-9708-019B960494DF}">
+              <a14:hiddenLine xmlns:a14="http://schemas.microsoft.com/office/drawing/2010/main" w="9525">
+                <a:solidFill>
+                  <a:schemeClr val="tx1"/>
+                </a:solidFill>
+                <a:miter lim="800000"/>
+                <a:headEnd/>
+                <a:tailEnd/>
+              </a14:hiddenLine>
+            </a:ext>
+            <a:ext uri="{AF507438-7753-43E0-B8FC-AC1667EBCBE1}">
+              <a14:hiddenEffects xmlns:a14="http://schemas.microsoft.com/office/drawing/2010/main">
+                <a:effectLst>
+                  <a:outerShdw dist="35921" dir="2700000" algn="ctr" rotWithShape="0">
+                    <a:schemeClr val="bg2"/>
+                  </a:outerShdw>
+                </a:effectLst>
+              </a14:hiddenEffects>
+            </a:ext>
+          </a:extLst>
+        </p:spPr>
+        <p:txBody>
+          <a:bodyPr vert="horz" wrap="square" lIns="91440" tIns="45720" rIns="91440" bIns="45720" numCol="1" anchor="ctr" anchorCtr="0" compatLnSpc="1">
+            <a:prstTxWarp prst="textNoShape">
+              <a:avLst/>
+            </a:prstTxWarp>
+            <a:spAutoFit/>
+          </a:bodyPr>
+          <a:lstStyle/>
+          <a:p>
+            <a:pPr marL="0" marR="0" lvl="0" indent="0" algn="ctr" defTabSz="914400" rtl="0" eaLnBrk="0" fontAlgn="base" latinLnBrk="0" hangingPunct="0">
+              <a:lnSpc>
+                <a:spcPct val="100000"/>
+              </a:lnSpc>
+              <a:spcBef>
+                <a:spcPct val="0"/>
+              </a:spcBef>
+              <a:spcAft>
+                <a:spcPct val="0"/>
+              </a:spcAft>
+              <a:buClrTx/>
+              <a:buSzTx/>
+              <a:buFontTx/>
+              <a:buNone/>
+              <a:tabLst/>
+            </a:pPr>
+            <a:r>
+              <a:rPr kumimoji="0" lang="en-US" altLang="en-US" sz="6000" b="1" i="0" u="none" strike="noStrike" cap="none" normalizeH="0" baseline="0" dirty="0">
+                <a:ln>
+                  <a:noFill/>
+                </a:ln>
+                <a:solidFill>
+                  <a:srgbClr val="000000"/>
+                </a:solidFill>
+                <a:effectLst/>
+                <a:latin typeface="Calibri" panose="020F0502020204030204" pitchFamily="34" charset="0"/>
+              </a:rPr>
+              <a:t>Relations</a:t>
+            </a:r>
+            <a:endParaRPr kumimoji="0" lang="en-US" altLang="en-US" sz="1000" b="0" i="0" u="none" strike="noStrike" cap="none" normalizeH="0" baseline="0" dirty="0">
+              <a:ln>
+                <a:noFill/>
+              </a:ln>
+              <a:solidFill>
+                <a:srgbClr val="000000"/>
+              </a:solidFill>
+              <a:effectLst/>
+              <a:latin typeface="-webkit-standard"/>
+            </a:endParaRPr>
+          </a:p>
+          <a:p>
+            <a:pPr marL="0" marR="0" lvl="0" indent="0" algn="l" defTabSz="914400" rtl="0" eaLnBrk="0" fontAlgn="base" latinLnBrk="0" hangingPunct="0">
+              <a:lnSpc>
+                <a:spcPct val="100000"/>
+              </a:lnSpc>
+              <a:spcBef>
+                <a:spcPct val="0"/>
+              </a:spcBef>
+              <a:spcAft>
+                <a:spcPct val="0"/>
+              </a:spcAft>
+              <a:buClrTx/>
+              <a:buSzTx/>
+              <a:buFontTx/>
+              <a:buNone/>
+              <a:tabLst/>
+            </a:pPr>
+            <a:r>
+              <a:rPr kumimoji="0" lang="en-US" altLang="en-US" sz="1800" b="0" i="0" u="none" strike="noStrike" cap="none" normalizeH="0" baseline="0" dirty="0">
+                <a:ln>
+                  <a:noFill/>
+                </a:ln>
+                <a:solidFill>
+                  <a:srgbClr val="000000"/>
+                </a:solidFill>
+                <a:effectLst/>
+                <a:latin typeface="-webkit-standard"/>
+              </a:rPr>
+              <a:t>  </a:t>
+            </a:r>
+            <a:r>
+              <a:rPr kumimoji="0" lang="en-US" altLang="en-US" sz="34600" b="0" i="0" u="none" strike="noStrike" cap="none" normalizeH="0" baseline="0" dirty="0">
+                <a:ln>
+                  <a:noFill/>
+                </a:ln>
+                <a:solidFill>
+                  <a:srgbClr val="000000"/>
+                </a:solidFill>
+                <a:effectLst/>
+                <a:latin typeface="-webkit-standard"/>
+              </a:rPr>
+              <a:t>          </a:t>
+            </a:r>
+            <a:br>
+              <a:rPr kumimoji="0" lang="en-US" altLang="en-US" sz="1800" b="0" i="0" u="none" strike="noStrike" cap="none" normalizeH="0" baseline="0" dirty="0">
+                <a:ln>
+                  <a:noFill/>
+                </a:ln>
+                <a:solidFill>
+                  <a:srgbClr val="000000"/>
+                </a:solidFill>
+                <a:effectLst/>
+                <a:latin typeface="-webkit-standard"/>
+              </a:rPr>
+            </a:br>
+            <a:endParaRPr kumimoji="0" lang="en-US" altLang="en-US" sz="1800" b="0" i="0" u="none" strike="noStrike" cap="none" normalizeH="0" baseline="0" dirty="0">
+              <a:ln>
+                <a:noFill/>
+              </a:ln>
+              <a:solidFill>
+                <a:srgbClr val="000000"/>
+              </a:solidFill>
+              <a:effectLst/>
+              <a:latin typeface="-webkit-standard"/>
+            </a:endParaRPr>
+          </a:p>
+          <a:p>
+            <a:pPr marL="0" marR="0" lvl="0" indent="0" algn="l" defTabSz="914400" rtl="0" eaLnBrk="0" fontAlgn="base" latinLnBrk="0" hangingPunct="0">
+              <a:lnSpc>
+                <a:spcPct val="100000"/>
+              </a:lnSpc>
+              <a:spcBef>
+                <a:spcPct val="0"/>
+              </a:spcBef>
+              <a:spcAft>
+                <a:spcPct val="0"/>
+              </a:spcAft>
+              <a:buClrTx/>
+              <a:buSzTx/>
+              <a:buFontTx/>
+              <a:buNone/>
+              <a:tabLst/>
+            </a:pPr>
+            <a:r>
+              <a:rPr kumimoji="0" lang="en-US" altLang="en-US" sz="1000" b="0" i="0" u="none" strike="noStrike" cap="none" normalizeH="0" baseline="0" dirty="0">
+                <a:ln>
+                  <a:noFill/>
+                </a:ln>
+                <a:solidFill>
+                  <a:srgbClr val="000000"/>
+                </a:solidFill>
+                <a:effectLst/>
+                <a:latin typeface="Arial" panose="020B0604020202020204" pitchFamily="34" charset="0"/>
+              </a:rPr>
+              <a:t>https://</a:t>
+            </a:r>
+            <a:r>
+              <a:rPr kumimoji="0" lang="en-US" altLang="en-US" sz="1000" b="0" i="0" u="none" strike="noStrike" cap="none" normalizeH="0" baseline="0" dirty="0" err="1">
+                <a:ln>
+                  <a:noFill/>
+                </a:ln>
+                <a:solidFill>
+                  <a:srgbClr val="000000"/>
+                </a:solidFill>
+                <a:effectLst/>
+                <a:latin typeface="Arial" panose="020B0604020202020204" pitchFamily="34" charset="0"/>
+              </a:rPr>
+              <a:t>thornleyfallis.com</a:t>
+            </a:r>
+            <a:r>
+              <a:rPr kumimoji="0" lang="en-US" altLang="en-US" sz="1000" b="0" i="0" u="none" strike="noStrike" cap="none" normalizeH="0" baseline="0" dirty="0">
+                <a:ln>
+                  <a:noFill/>
+                </a:ln>
+                <a:solidFill>
+                  <a:srgbClr val="000000"/>
+                </a:solidFill>
+                <a:effectLst/>
+                <a:latin typeface="Arial" panose="020B0604020202020204" pitchFamily="34" charset="0"/>
+              </a:rPr>
+              <a:t>/public-relations/</a:t>
+            </a:r>
+            <a:endParaRPr kumimoji="0" lang="en-US" altLang="en-US" sz="1000" b="0" i="0" u="none" strike="noStrike" cap="none" normalizeH="0" baseline="0" dirty="0">
+              <a:ln>
+                <a:noFill/>
+              </a:ln>
+              <a:solidFill>
+                <a:srgbClr val="000000"/>
+              </a:solidFill>
+              <a:effectLst/>
+              <a:latin typeface="-webkit-standard"/>
+            </a:endParaRPr>
+          </a:p>
+          <a:p>
+            <a:pPr marL="0" marR="0" lvl="0" indent="0" algn="l" defTabSz="914400" rtl="0" eaLnBrk="0" fontAlgn="base" latinLnBrk="0" hangingPunct="0">
+              <a:lnSpc>
+                <a:spcPct val="100000"/>
+              </a:lnSpc>
+              <a:spcBef>
+                <a:spcPct val="0"/>
+              </a:spcBef>
+              <a:spcAft>
+                <a:spcPct val="0"/>
+              </a:spcAft>
+              <a:buClrTx/>
+              <a:buSzTx/>
+              <a:buFontTx/>
+              <a:buNone/>
+              <a:tabLst/>
+            </a:pPr>
+            <a:endParaRPr kumimoji="0" lang="en-US" altLang="en-US" sz="1000" b="0" i="0" u="none" strike="noStrike" cap="none" normalizeH="0" baseline="0" dirty="0">
+              <a:ln>
+                <a:noFill/>
+              </a:ln>
+              <a:solidFill>
+                <a:srgbClr val="000000"/>
+              </a:solidFill>
+              <a:effectLst/>
+              <a:latin typeface="-webkit-standard"/>
+            </a:endParaRPr>
+          </a:p>
+          <a:p>
+            <a:pPr marL="0" marR="0" lvl="0" indent="0" algn="l" defTabSz="914400" rtl="0" eaLnBrk="0" fontAlgn="base" latinLnBrk="0" hangingPunct="0">
+              <a:lnSpc>
+                <a:spcPct val="100000"/>
+              </a:lnSpc>
+              <a:spcBef>
+                <a:spcPct val="0"/>
+              </a:spcBef>
+              <a:spcAft>
+                <a:spcPct val="0"/>
+              </a:spcAft>
+              <a:buClrTx/>
+              <a:buSzTx/>
+              <a:buFontTx/>
+              <a:buNone/>
+              <a:tabLst/>
+            </a:pPr>
+            <a:br>
+              <a:rPr kumimoji="0" lang="en-US" altLang="en-US" sz="1800" b="0" i="0" u="none" strike="noStrike" cap="none" normalizeH="0" baseline="0" dirty="0">
+                <a:ln>
+                  <a:noFill/>
+                </a:ln>
+                <a:solidFill>
+                  <a:srgbClr val="000000"/>
+                </a:solidFill>
+                <a:effectLst/>
+                <a:latin typeface="-webkit-standard"/>
+              </a:rPr>
+            </a:br>
+            <a:endParaRPr kumimoji="0" lang="en-US" altLang="en-US" sz="1800" b="0" i="0" u="none" strike="noStrike" cap="none" normalizeH="0" baseline="0" dirty="0">
+              <a:ln>
+                <a:noFill/>
+              </a:ln>
+              <a:solidFill>
+                <a:srgbClr val="000000"/>
+              </a:solidFill>
+              <a:effectLst/>
+              <a:latin typeface="-webkit-standard"/>
+            </a:endParaRPr>
+          </a:p>
+          <a:p>
+            <a:pPr marL="0" marR="0" lvl="0" indent="0" algn="l" defTabSz="914400" rtl="0" eaLnBrk="0" fontAlgn="base" latinLnBrk="0" hangingPunct="0">
+              <a:lnSpc>
+                <a:spcPct val="100000"/>
+              </a:lnSpc>
+              <a:spcBef>
+                <a:spcPct val="0"/>
+              </a:spcBef>
+              <a:spcAft>
+                <a:spcPct val="0"/>
+              </a:spcAft>
+              <a:buClrTx/>
+              <a:buSzTx/>
+              <a:buFontTx/>
+              <a:buNone/>
+              <a:tabLst/>
+            </a:pPr>
+            <a:r>
+              <a:rPr kumimoji="0" lang="en-US" altLang="en-US" sz="1300" b="0" i="0" u="none" strike="noStrike" cap="none" normalizeH="0" baseline="0" dirty="0">
+                <a:ln>
+                  <a:noFill/>
+                </a:ln>
+                <a:solidFill>
+                  <a:srgbClr val="EEECE1"/>
+                </a:solidFill>
+                <a:effectLst/>
+                <a:latin typeface="Times New Roman" panose="02020603050405020304" pitchFamily="18" charset="0"/>
+              </a:rPr>
+              <a:t>9</a:t>
+            </a:r>
+            <a:endParaRPr kumimoji="0" lang="en-US" altLang="en-US" sz="1000" b="0" i="0" u="none" strike="noStrike" cap="none" normalizeH="0" baseline="0" dirty="0">
+              <a:ln>
+                <a:noFill/>
+              </a:ln>
+              <a:solidFill>
+                <a:srgbClr val="000000"/>
+              </a:solidFill>
+              <a:effectLst/>
+              <a:latin typeface="-webkit-standard"/>
+            </a:endParaRPr>
+          </a:p>
+          <a:p>
+            <a:pPr marL="0" marR="0" lvl="0" indent="0" algn="l" defTabSz="914400" rtl="0" eaLnBrk="0" fontAlgn="base" latinLnBrk="0" hangingPunct="0">
+              <a:lnSpc>
+                <a:spcPct val="100000"/>
+              </a:lnSpc>
+              <a:spcBef>
+                <a:spcPct val="0"/>
+              </a:spcBef>
+              <a:spcAft>
+                <a:spcPct val="0"/>
+              </a:spcAft>
+              <a:buClrTx/>
+              <a:buSzTx/>
+              <a:buFontTx/>
+              <a:buNone/>
+              <a:tabLst/>
+            </a:pPr>
+            <a:br>
+              <a:rPr kumimoji="0" lang="en-US" altLang="en-US" sz="1800" b="0" i="0" u="none" strike="noStrike" cap="none" normalizeH="0" baseline="0" dirty="0">
+                <a:ln>
+                  <a:noFill/>
+                </a:ln>
+                <a:solidFill>
+                  <a:schemeClr val="tx1"/>
+                </a:solidFill>
+                <a:effectLst/>
+              </a:rPr>
+            </a:br>
+            <a:br>
+              <a:rPr kumimoji="0" lang="en-US" altLang="en-US" sz="1800" b="0" i="0" u="none" strike="noStrike" cap="none" normalizeH="0" baseline="0" dirty="0">
+                <a:ln>
+                  <a:noFill/>
+                </a:ln>
+                <a:solidFill>
+                  <a:schemeClr val="tx1"/>
+                </a:solidFill>
+                <a:effectLst/>
+                <a:latin typeface="Arial" panose="020B0604020202020204" pitchFamily="34" charset="0"/>
+              </a:rPr>
+            </a:br>
+            <a:endParaRPr kumimoji="0" lang="en-US" altLang="en-US" sz="1800" b="0" i="0" u="none" strike="noStrike" cap="none" normalizeH="0" baseline="0" dirty="0">
+              <a:ln>
+                <a:noFill/>
+              </a:ln>
+              <a:solidFill>
+                <a:schemeClr val="tx1"/>
+              </a:solidFill>
+              <a:effectLst/>
+              <a:latin typeface="Arial" panose="020B0604020202020204" pitchFamily="34" charset="0"/>
+            </a:endParaRPr>
+          </a:p>
+        </p:txBody>
+      </p:sp>
+      <p:pic>
+        <p:nvPicPr>
+          <p:cNvPr id="1026" name="Picture 2" descr="https://lh6.googleusercontent.com/dSnlmQ5pkC9ceRkMWQMJ9MOJ0V7G0HQpkNyQyg6S6jvJH--bVhuNQeZuU8YZsPmgIlOcl36U-IPpzGISqRkDVfhH1Mi7LLFhid7UzsaTuHZpLXVSBpbT6YRiY0VvyVH4iDObSngdfmw">
+            <a:extLst>
+              <a:ext uri="{FF2B5EF4-FFF2-40B4-BE49-F238E27FC236}">
+                <a16:creationId xmlns:a16="http://schemas.microsoft.com/office/drawing/2014/main" id="{72DFF631-2EF3-F549-B61B-72169C1D9814}"/>
+              </a:ext>
+            </a:extLst>
+          </p:cNvPr>
+          <p:cNvPicPr>
+            <a:picLocks noChangeAspect="1" noChangeArrowheads="1"/>
+          </p:cNvPicPr>
+          <p:nvPr/>
+        </p:nvPicPr>
+        <p:blipFill>
+          <a:blip r:embed="rId2">
+            <a:extLst>
+              <a:ext uri="{28A0092B-C50C-407E-A947-70E740481C1C}">
+                <a14:useLocalDpi xmlns:a14="http://schemas.microsoft.com/office/drawing/2010/main" val="0"/>
+              </a:ext>
+            </a:extLst>
+          </a:blip>
+          <a:srcRect/>
+          <a:stretch>
+            <a:fillRect/>
+          </a:stretch>
+        </p:blipFill>
+        <p:spPr bwMode="auto">
+          <a:xfrm>
+            <a:off x="2178270" y="1398951"/>
+            <a:ext cx="7835458" cy="4406173"/>
+          </a:xfrm>
+          <a:prstGeom prst="rect">
+            <a:avLst/>
+          </a:prstGeom>
+          <a:noFill/>
+          <a:extLst>
+            <a:ext uri="{909E8E84-426E-40DD-AFC4-6F175D3DCCD1}">
+              <a14:hiddenFill xmlns:a14="http://schemas.microsoft.com/office/drawing/2010/main">
+                <a:solidFill>
+                  <a:srgbClr val="FFFFFF"/>
+                </a:solidFill>
+              </a14:hiddenFill>
+            </a:ext>
+          </a:extLst>
+        </p:spPr>
+      </p:pic>
+    </p:spTree>
+    <p:extLst>
+      <p:ext uri="{BB962C8B-B14F-4D97-AF65-F5344CB8AC3E}">
+        <p14:creationId xmlns:p14="http://schemas.microsoft.com/office/powerpoint/2010/main" val="2066557647"/>
+      </p:ext>
+    </p:extLst>
+  </p:cSld>
+  <p:clrMapOvr>
+    <a:masterClrMapping/>
+  </p:clrMapOvr>
+</p:sld>
+</file>
+
+<file path=ppt/slides/slide20.xml><?xml version="1.0" encoding="utf-8"?>
 <p:sld xmlns:a="http://schemas.openxmlformats.org/drawingml/2006/main" xmlns:r="http://schemas.openxmlformats.org/officeDocument/2006/relationships" xmlns:p="http://schemas.openxmlformats.org/presentationml/2006/main">
   <p:cSld>
     <p:spTree>
@@ -28734,534 +29785,7 @@
 </p:sld>
 </file>
 
-<file path=ppt/slides/slide2.xml><?xml version="1.0" encoding="utf-8"?>
-<p:sld xmlns:a="http://schemas.openxmlformats.org/drawingml/2006/main" xmlns:r="http://schemas.openxmlformats.org/officeDocument/2006/relationships" xmlns:p="http://schemas.openxmlformats.org/presentationml/2006/main">
-  <p:cSld>
-    <p:spTree>
-      <p:nvGrpSpPr>
-        <p:cNvPr id="1" name=""/>
-        <p:cNvGrpSpPr/>
-        <p:nvPr/>
-      </p:nvGrpSpPr>
-      <p:grpSpPr>
-        <a:xfrm>
-          <a:off x="0" y="0"/>
-          <a:ext cx="0" cy="0"/>
-          <a:chOff x="0" y="0"/>
-          <a:chExt cx="0" cy="0"/>
-        </a:xfrm>
-      </p:grpSpPr>
-      <p:sp>
-        <p:nvSpPr>
-          <p:cNvPr id="2" name="Title 1">
-            <a:extLst>
-              <a:ext uri="{FF2B5EF4-FFF2-40B4-BE49-F238E27FC236}">
-                <a16:creationId xmlns:a16="http://schemas.microsoft.com/office/drawing/2014/main" id="{ADF6043B-194E-FF43-9784-7D178CBD4AC5}"/>
-              </a:ext>
-            </a:extLst>
-          </p:cNvPr>
-          <p:cNvSpPr>
-            <a:spLocks noGrp="1"/>
-          </p:cNvSpPr>
-          <p:nvPr>
-            <p:ph type="ctrTitle"/>
-          </p:nvPr>
-        </p:nvSpPr>
-        <p:spPr/>
-        <p:txBody>
-          <a:bodyPr/>
-          <a:lstStyle/>
-          <a:p>
-            <a:endParaRPr lang="en-US"/>
-          </a:p>
-        </p:txBody>
-      </p:sp>
-      <p:sp>
-        <p:nvSpPr>
-          <p:cNvPr id="3" name="Subtitle 2">
-            <a:extLst>
-              <a:ext uri="{FF2B5EF4-FFF2-40B4-BE49-F238E27FC236}">
-                <a16:creationId xmlns:a16="http://schemas.microsoft.com/office/drawing/2014/main" id="{52958691-4213-DE44-A67C-FF2F71F2DC61}"/>
-              </a:ext>
-            </a:extLst>
-          </p:cNvPr>
-          <p:cNvSpPr>
-            <a:spLocks noGrp="1"/>
-          </p:cNvSpPr>
-          <p:nvPr>
-            <p:ph type="subTitle" idx="1"/>
-          </p:nvPr>
-        </p:nvSpPr>
-        <p:spPr/>
-        <p:txBody>
-          <a:bodyPr/>
-          <a:lstStyle/>
-          <a:p>
-            <a:endParaRPr lang="en-US"/>
-          </a:p>
-        </p:txBody>
-      </p:sp>
-      <p:sp>
-        <p:nvSpPr>
-          <p:cNvPr id="4" name="Rectangle 1">
-            <a:extLst>
-              <a:ext uri="{FF2B5EF4-FFF2-40B4-BE49-F238E27FC236}">
-                <a16:creationId xmlns:a16="http://schemas.microsoft.com/office/drawing/2014/main" id="{454280DF-5B84-E247-AE2C-C5A292E8A891}"/>
-              </a:ext>
-            </a:extLst>
-          </p:cNvPr>
-          <p:cNvSpPr>
-            <a:spLocks noChangeArrowheads="1"/>
-          </p:cNvSpPr>
-          <p:nvPr/>
-        </p:nvSpPr>
-        <p:spPr bwMode="auto">
-          <a:xfrm>
-            <a:off x="551419" y="74428"/>
-            <a:ext cx="11089159" cy="8510022"/>
-          </a:xfrm>
-          <a:prstGeom prst="rect">
-            <a:avLst/>
-          </a:prstGeom>
-          <a:noFill/>
-          <a:ln>
-            <a:noFill/>
-          </a:ln>
-          <a:effectLst/>
-          <a:extLst>
-            <a:ext uri="{909E8E84-426E-40DD-AFC4-6F175D3DCCD1}">
-              <a14:hiddenFill xmlns:a14="http://schemas.microsoft.com/office/drawing/2010/main">
-                <a:solidFill>
-                  <a:schemeClr val="accent1"/>
-                </a:solidFill>
-              </a14:hiddenFill>
-            </a:ext>
-            <a:ext uri="{91240B29-F687-4F45-9708-019B960494DF}">
-              <a14:hiddenLine xmlns:a14="http://schemas.microsoft.com/office/drawing/2010/main" w="9525">
-                <a:solidFill>
-                  <a:schemeClr val="tx1"/>
-                </a:solidFill>
-                <a:miter lim="800000"/>
-                <a:headEnd/>
-                <a:tailEnd/>
-              </a14:hiddenLine>
-            </a:ext>
-            <a:ext uri="{AF507438-7753-43E0-B8FC-AC1667EBCBE1}">
-              <a14:hiddenEffects xmlns:a14="http://schemas.microsoft.com/office/drawing/2010/main">
-                <a:effectLst>
-                  <a:outerShdw dist="35921" dir="2700000" algn="ctr" rotWithShape="0">
-                    <a:schemeClr val="bg2"/>
-                  </a:outerShdw>
-                </a:effectLst>
-              </a14:hiddenEffects>
-            </a:ext>
-          </a:extLst>
-        </p:spPr>
-        <p:txBody>
-          <a:bodyPr vert="horz" wrap="square" lIns="91440" tIns="45720" rIns="91440" bIns="45720" numCol="1" anchor="ctr" anchorCtr="0" compatLnSpc="1">
-            <a:prstTxWarp prst="textNoShape">
-              <a:avLst/>
-            </a:prstTxWarp>
-            <a:spAutoFit/>
-          </a:bodyPr>
-          <a:lstStyle/>
-          <a:p>
-            <a:pPr marL="0" marR="0" lvl="0" indent="0" algn="ctr" defTabSz="914400" rtl="0" eaLnBrk="0" fontAlgn="base" latinLnBrk="0" hangingPunct="0">
-              <a:lnSpc>
-                <a:spcPct val="100000"/>
-              </a:lnSpc>
-              <a:spcBef>
-                <a:spcPct val="0"/>
-              </a:spcBef>
-              <a:spcAft>
-                <a:spcPct val="0"/>
-              </a:spcAft>
-              <a:buClrTx/>
-              <a:buSzTx/>
-              <a:buFontTx/>
-              <a:buNone/>
-              <a:tabLst/>
-            </a:pPr>
-            <a:r>
-              <a:rPr kumimoji="0" lang="en-US" altLang="en-US" sz="6000" b="1" i="0" u="none" strike="noStrike" cap="none" normalizeH="0" baseline="0" dirty="0">
-                <a:ln>
-                  <a:noFill/>
-                </a:ln>
-                <a:solidFill>
-                  <a:srgbClr val="000000"/>
-                </a:solidFill>
-                <a:effectLst/>
-                <a:latin typeface="Calibri" panose="020F0502020204030204" pitchFamily="34" charset="0"/>
-              </a:rPr>
-              <a:t>Relations</a:t>
-            </a:r>
-            <a:endParaRPr kumimoji="0" lang="en-US" altLang="en-US" sz="1000" b="0" i="0" u="none" strike="noStrike" cap="none" normalizeH="0" baseline="0" dirty="0">
-              <a:ln>
-                <a:noFill/>
-              </a:ln>
-              <a:solidFill>
-                <a:srgbClr val="000000"/>
-              </a:solidFill>
-              <a:effectLst/>
-              <a:latin typeface="-webkit-standard"/>
-            </a:endParaRPr>
-          </a:p>
-          <a:p>
-            <a:pPr marL="0" marR="0" lvl="0" indent="0" algn="l" defTabSz="914400" rtl="0" eaLnBrk="0" fontAlgn="base" latinLnBrk="0" hangingPunct="0">
-              <a:lnSpc>
-                <a:spcPct val="100000"/>
-              </a:lnSpc>
-              <a:spcBef>
-                <a:spcPct val="0"/>
-              </a:spcBef>
-              <a:spcAft>
-                <a:spcPct val="0"/>
-              </a:spcAft>
-              <a:buClrTx/>
-              <a:buSzTx/>
-              <a:buFontTx/>
-              <a:buNone/>
-              <a:tabLst/>
-            </a:pPr>
-            <a:r>
-              <a:rPr kumimoji="0" lang="en-US" altLang="en-US" sz="1800" b="0" i="0" u="none" strike="noStrike" cap="none" normalizeH="0" baseline="0" dirty="0">
-                <a:ln>
-                  <a:noFill/>
-                </a:ln>
-                <a:solidFill>
-                  <a:srgbClr val="000000"/>
-                </a:solidFill>
-                <a:effectLst/>
-                <a:latin typeface="-webkit-standard"/>
-              </a:rPr>
-              <a:t>  </a:t>
-            </a:r>
-            <a:r>
-              <a:rPr kumimoji="0" lang="en-US" altLang="en-US" sz="34600" b="0" i="0" u="none" strike="noStrike" cap="none" normalizeH="0" baseline="0" dirty="0">
-                <a:ln>
-                  <a:noFill/>
-                </a:ln>
-                <a:solidFill>
-                  <a:srgbClr val="000000"/>
-                </a:solidFill>
-                <a:effectLst/>
-                <a:latin typeface="-webkit-standard"/>
-              </a:rPr>
-              <a:t>          </a:t>
-            </a:r>
-            <a:br>
-              <a:rPr kumimoji="0" lang="en-US" altLang="en-US" sz="1800" b="0" i="0" u="none" strike="noStrike" cap="none" normalizeH="0" baseline="0" dirty="0">
-                <a:ln>
-                  <a:noFill/>
-                </a:ln>
-                <a:solidFill>
-                  <a:srgbClr val="000000"/>
-                </a:solidFill>
-                <a:effectLst/>
-                <a:latin typeface="-webkit-standard"/>
-              </a:rPr>
-            </a:br>
-            <a:endParaRPr kumimoji="0" lang="en-US" altLang="en-US" sz="1800" b="0" i="0" u="none" strike="noStrike" cap="none" normalizeH="0" baseline="0" dirty="0">
-              <a:ln>
-                <a:noFill/>
-              </a:ln>
-              <a:solidFill>
-                <a:srgbClr val="000000"/>
-              </a:solidFill>
-              <a:effectLst/>
-              <a:latin typeface="-webkit-standard"/>
-            </a:endParaRPr>
-          </a:p>
-          <a:p>
-            <a:pPr marL="0" marR="0" lvl="0" indent="0" algn="l" defTabSz="914400" rtl="0" eaLnBrk="0" fontAlgn="base" latinLnBrk="0" hangingPunct="0">
-              <a:lnSpc>
-                <a:spcPct val="100000"/>
-              </a:lnSpc>
-              <a:spcBef>
-                <a:spcPct val="0"/>
-              </a:spcBef>
-              <a:spcAft>
-                <a:spcPct val="0"/>
-              </a:spcAft>
-              <a:buClrTx/>
-              <a:buSzTx/>
-              <a:buFontTx/>
-              <a:buNone/>
-              <a:tabLst/>
-            </a:pPr>
-            <a:r>
-              <a:rPr kumimoji="0" lang="en-US" altLang="en-US" sz="1000" b="0" i="0" u="none" strike="noStrike" cap="none" normalizeH="0" baseline="0" dirty="0">
-                <a:ln>
-                  <a:noFill/>
-                </a:ln>
-                <a:solidFill>
-                  <a:srgbClr val="000000"/>
-                </a:solidFill>
-                <a:effectLst/>
-                <a:latin typeface="Arial" panose="020B0604020202020204" pitchFamily="34" charset="0"/>
-              </a:rPr>
-              <a:t>https://</a:t>
-            </a:r>
-            <a:r>
-              <a:rPr kumimoji="0" lang="en-US" altLang="en-US" sz="1000" b="0" i="0" u="none" strike="noStrike" cap="none" normalizeH="0" baseline="0" dirty="0" err="1">
-                <a:ln>
-                  <a:noFill/>
-                </a:ln>
-                <a:solidFill>
-                  <a:srgbClr val="000000"/>
-                </a:solidFill>
-                <a:effectLst/>
-                <a:latin typeface="Arial" panose="020B0604020202020204" pitchFamily="34" charset="0"/>
-              </a:rPr>
-              <a:t>thornleyfallis.com</a:t>
-            </a:r>
-            <a:r>
-              <a:rPr kumimoji="0" lang="en-US" altLang="en-US" sz="1000" b="0" i="0" u="none" strike="noStrike" cap="none" normalizeH="0" baseline="0" dirty="0">
-                <a:ln>
-                  <a:noFill/>
-                </a:ln>
-                <a:solidFill>
-                  <a:srgbClr val="000000"/>
-                </a:solidFill>
-                <a:effectLst/>
-                <a:latin typeface="Arial" panose="020B0604020202020204" pitchFamily="34" charset="0"/>
-              </a:rPr>
-              <a:t>/public-relations/</a:t>
-            </a:r>
-            <a:endParaRPr kumimoji="0" lang="en-US" altLang="en-US" sz="1000" b="0" i="0" u="none" strike="noStrike" cap="none" normalizeH="0" baseline="0" dirty="0">
-              <a:ln>
-                <a:noFill/>
-              </a:ln>
-              <a:solidFill>
-                <a:srgbClr val="000000"/>
-              </a:solidFill>
-              <a:effectLst/>
-              <a:latin typeface="-webkit-standard"/>
-            </a:endParaRPr>
-          </a:p>
-          <a:p>
-            <a:pPr marL="0" marR="0" lvl="0" indent="0" algn="l" defTabSz="914400" rtl="0" eaLnBrk="0" fontAlgn="base" latinLnBrk="0" hangingPunct="0">
-              <a:lnSpc>
-                <a:spcPct val="100000"/>
-              </a:lnSpc>
-              <a:spcBef>
-                <a:spcPct val="0"/>
-              </a:spcBef>
-              <a:spcAft>
-                <a:spcPct val="0"/>
-              </a:spcAft>
-              <a:buClrTx/>
-              <a:buSzTx/>
-              <a:buFontTx/>
-              <a:buNone/>
-              <a:tabLst/>
-            </a:pPr>
-            <a:endParaRPr kumimoji="0" lang="en-US" altLang="en-US" sz="1000" b="0" i="0" u="none" strike="noStrike" cap="none" normalizeH="0" baseline="0" dirty="0">
-              <a:ln>
-                <a:noFill/>
-              </a:ln>
-              <a:solidFill>
-                <a:srgbClr val="000000"/>
-              </a:solidFill>
-              <a:effectLst/>
-              <a:latin typeface="-webkit-standard"/>
-            </a:endParaRPr>
-          </a:p>
-          <a:p>
-            <a:pPr marL="0" marR="0" lvl="0" indent="0" algn="l" defTabSz="914400" rtl="0" eaLnBrk="0" fontAlgn="base" latinLnBrk="0" hangingPunct="0">
-              <a:lnSpc>
-                <a:spcPct val="100000"/>
-              </a:lnSpc>
-              <a:spcBef>
-                <a:spcPct val="0"/>
-              </a:spcBef>
-              <a:spcAft>
-                <a:spcPct val="0"/>
-              </a:spcAft>
-              <a:buClrTx/>
-              <a:buSzTx/>
-              <a:buFontTx/>
-              <a:buNone/>
-              <a:tabLst/>
-            </a:pPr>
-            <a:br>
-              <a:rPr kumimoji="0" lang="en-US" altLang="en-US" sz="1800" b="0" i="0" u="none" strike="noStrike" cap="none" normalizeH="0" baseline="0" dirty="0">
-                <a:ln>
-                  <a:noFill/>
-                </a:ln>
-                <a:solidFill>
-                  <a:srgbClr val="000000"/>
-                </a:solidFill>
-                <a:effectLst/>
-                <a:latin typeface="-webkit-standard"/>
-              </a:rPr>
-            </a:br>
-            <a:endParaRPr kumimoji="0" lang="en-US" altLang="en-US" sz="1800" b="0" i="0" u="none" strike="noStrike" cap="none" normalizeH="0" baseline="0" dirty="0">
-              <a:ln>
-                <a:noFill/>
-              </a:ln>
-              <a:solidFill>
-                <a:srgbClr val="000000"/>
-              </a:solidFill>
-              <a:effectLst/>
-              <a:latin typeface="-webkit-standard"/>
-            </a:endParaRPr>
-          </a:p>
-          <a:p>
-            <a:pPr marL="0" marR="0" lvl="0" indent="0" algn="l" defTabSz="914400" rtl="0" eaLnBrk="0" fontAlgn="base" latinLnBrk="0" hangingPunct="0">
-              <a:lnSpc>
-                <a:spcPct val="100000"/>
-              </a:lnSpc>
-              <a:spcBef>
-                <a:spcPct val="0"/>
-              </a:spcBef>
-              <a:spcAft>
-                <a:spcPct val="0"/>
-              </a:spcAft>
-              <a:buClrTx/>
-              <a:buSzTx/>
-              <a:buFontTx/>
-              <a:buNone/>
-              <a:tabLst/>
-            </a:pPr>
-            <a:r>
-              <a:rPr kumimoji="0" lang="en-US" altLang="en-US" sz="1300" b="0" i="0" u="none" strike="noStrike" cap="none" normalizeH="0" baseline="0" dirty="0">
-                <a:ln>
-                  <a:noFill/>
-                </a:ln>
-                <a:solidFill>
-                  <a:srgbClr val="EEECE1"/>
-                </a:solidFill>
-                <a:effectLst/>
-                <a:latin typeface="Times New Roman" panose="02020603050405020304" pitchFamily="18" charset="0"/>
-              </a:rPr>
-              <a:t>9</a:t>
-            </a:r>
-            <a:endParaRPr kumimoji="0" lang="en-US" altLang="en-US" sz="1000" b="0" i="0" u="none" strike="noStrike" cap="none" normalizeH="0" baseline="0" dirty="0">
-              <a:ln>
-                <a:noFill/>
-              </a:ln>
-              <a:solidFill>
-                <a:srgbClr val="000000"/>
-              </a:solidFill>
-              <a:effectLst/>
-              <a:latin typeface="-webkit-standard"/>
-            </a:endParaRPr>
-          </a:p>
-          <a:p>
-            <a:pPr marL="0" marR="0" lvl="0" indent="0" algn="l" defTabSz="914400" rtl="0" eaLnBrk="0" fontAlgn="base" latinLnBrk="0" hangingPunct="0">
-              <a:lnSpc>
-                <a:spcPct val="100000"/>
-              </a:lnSpc>
-              <a:spcBef>
-                <a:spcPct val="0"/>
-              </a:spcBef>
-              <a:spcAft>
-                <a:spcPct val="0"/>
-              </a:spcAft>
-              <a:buClrTx/>
-              <a:buSzTx/>
-              <a:buFontTx/>
-              <a:buNone/>
-              <a:tabLst/>
-            </a:pPr>
-            <a:br>
-              <a:rPr kumimoji="0" lang="en-US" altLang="en-US" sz="1800" b="0" i="0" u="none" strike="noStrike" cap="none" normalizeH="0" baseline="0" dirty="0">
-                <a:ln>
-                  <a:noFill/>
-                </a:ln>
-                <a:solidFill>
-                  <a:schemeClr val="tx1"/>
-                </a:solidFill>
-                <a:effectLst/>
-              </a:rPr>
-            </a:br>
-            <a:br>
-              <a:rPr kumimoji="0" lang="en-US" altLang="en-US" sz="1800" b="0" i="0" u="none" strike="noStrike" cap="none" normalizeH="0" baseline="0" dirty="0">
-                <a:ln>
-                  <a:noFill/>
-                </a:ln>
-                <a:solidFill>
-                  <a:schemeClr val="tx1"/>
-                </a:solidFill>
-                <a:effectLst/>
-                <a:latin typeface="Arial" panose="020B0604020202020204" pitchFamily="34" charset="0"/>
-              </a:rPr>
-            </a:br>
-            <a:endParaRPr kumimoji="0" lang="en-US" altLang="en-US" sz="1800" b="0" i="0" u="none" strike="noStrike" cap="none" normalizeH="0" baseline="0" dirty="0">
-              <a:ln>
-                <a:noFill/>
-              </a:ln>
-              <a:solidFill>
-                <a:schemeClr val="tx1"/>
-              </a:solidFill>
-              <a:effectLst/>
-              <a:latin typeface="Arial" panose="020B0604020202020204" pitchFamily="34" charset="0"/>
-            </a:endParaRPr>
-          </a:p>
-        </p:txBody>
-      </p:sp>
-      <p:pic>
-        <p:nvPicPr>
-          <p:cNvPr id="1026" name="Picture 2" descr="https://lh6.googleusercontent.com/dSnlmQ5pkC9ceRkMWQMJ9MOJ0V7G0HQpkNyQyg6S6jvJH--bVhuNQeZuU8YZsPmgIlOcl36U-IPpzGISqRkDVfhH1Mi7LLFhid7UzsaTuHZpLXVSBpbT6YRiY0VvyVH4iDObSngdfmw">
-            <a:extLst>
-              <a:ext uri="{FF2B5EF4-FFF2-40B4-BE49-F238E27FC236}">
-                <a16:creationId xmlns:a16="http://schemas.microsoft.com/office/drawing/2014/main" id="{72DFF631-2EF3-F549-B61B-72169C1D9814}"/>
-              </a:ext>
-            </a:extLst>
-          </p:cNvPr>
-          <p:cNvPicPr>
-            <a:picLocks noChangeAspect="1" noChangeArrowheads="1"/>
-          </p:cNvPicPr>
-          <p:nvPr/>
-        </p:nvPicPr>
-        <p:blipFill>
-          <a:blip r:embed="rId2">
-            <a:extLst>
-              <a:ext uri="{28A0092B-C50C-407E-A947-70E740481C1C}">
-                <a14:useLocalDpi xmlns:a14="http://schemas.microsoft.com/office/drawing/2010/main" val="0"/>
-              </a:ext>
-            </a:extLst>
-          </a:blip>
-          <a:srcRect/>
-          <a:stretch>
-            <a:fillRect/>
-          </a:stretch>
-        </p:blipFill>
-        <p:spPr bwMode="auto">
-          <a:xfrm>
-            <a:off x="2178270" y="1398951"/>
-            <a:ext cx="7835458" cy="4406173"/>
-          </a:xfrm>
-          <a:prstGeom prst="rect">
-            <a:avLst/>
-          </a:prstGeom>
-          <a:noFill/>
-          <a:extLst>
-            <a:ext uri="{909E8E84-426E-40DD-AFC4-6F175D3DCCD1}">
-              <a14:hiddenFill xmlns:a14="http://schemas.microsoft.com/office/drawing/2010/main">
-                <a:solidFill>
-                  <a:srgbClr val="FFFFFF"/>
-                </a:solidFill>
-              </a14:hiddenFill>
-            </a:ext>
-          </a:extLst>
-        </p:spPr>
-      </p:pic>
-    </p:spTree>
-    <p:extLst>
-      <p:ext uri="{BB962C8B-B14F-4D97-AF65-F5344CB8AC3E}">
-        <p14:creationId xmlns:p14="http://schemas.microsoft.com/office/powerpoint/2010/main" val="2066557647"/>
-      </p:ext>
-    </p:extLst>
-  </p:cSld>
-  <p:clrMapOvr>
-    <a:masterClrMapping/>
-  </p:clrMapOvr>
-</p:sld>
-</file>
-
-<file path=ppt/slides/slide20.xml><?xml version="1.0" encoding="utf-8"?>
+<file path=ppt/slides/slide21.xml><?xml version="1.0" encoding="utf-8"?>
 <p:sld xmlns:a="http://schemas.openxmlformats.org/drawingml/2006/main" xmlns:r="http://schemas.openxmlformats.org/officeDocument/2006/relationships" xmlns:p="http://schemas.openxmlformats.org/presentationml/2006/main">
   <p:cSld>
     <p:spTree>
@@ -32032,7 +32556,7 @@
 </p:sld>
 </file>
 
-<file path=ppt/slides/slide21.xml><?xml version="1.0" encoding="utf-8"?>
+<file path=ppt/slides/slide22.xml><?xml version="1.0" encoding="utf-8"?>
 <p:sld xmlns:a="http://schemas.openxmlformats.org/drawingml/2006/main" xmlns:r="http://schemas.openxmlformats.org/officeDocument/2006/relationships" xmlns:p="http://schemas.openxmlformats.org/presentationml/2006/main">
   <p:cSld>
     <p:spTree>
@@ -40411,6 +40935,135 @@
 </file>
 
 <file path=ppt/slides/slide8.xml><?xml version="1.0" encoding="utf-8"?>
+<p:sld xmlns:a="http://schemas.openxmlformats.org/drawingml/2006/main" xmlns:r="http://schemas.openxmlformats.org/officeDocument/2006/relationships" xmlns:p="http://schemas.openxmlformats.org/presentationml/2006/main">
+  <p:cSld>
+    <p:spTree>
+      <p:nvGrpSpPr>
+        <p:cNvPr id="1" name=""/>
+        <p:cNvGrpSpPr/>
+        <p:nvPr/>
+      </p:nvGrpSpPr>
+      <p:grpSpPr>
+        <a:xfrm>
+          <a:off x="0" y="0"/>
+          <a:ext cx="0" cy="0"/>
+          <a:chOff x="0" y="0"/>
+          <a:chExt cx="0" cy="0"/>
+        </a:xfrm>
+      </p:grpSpPr>
+      <p:sp>
+        <p:nvSpPr>
+          <p:cNvPr id="2" name="Title 1">
+            <a:extLst>
+              <a:ext uri="{FF2B5EF4-FFF2-40B4-BE49-F238E27FC236}">
+                <a16:creationId xmlns:a16="http://schemas.microsoft.com/office/drawing/2014/main" id="{63DFFFE0-DBD4-C24D-B915-182F8EA48429}"/>
+              </a:ext>
+            </a:extLst>
+          </p:cNvPr>
+          <p:cNvSpPr>
+            <a:spLocks noGrp="1"/>
+          </p:cNvSpPr>
+          <p:nvPr>
+            <p:ph type="title"/>
+          </p:nvPr>
+        </p:nvSpPr>
+        <p:spPr/>
+        <p:txBody>
+          <a:bodyPr/>
+          <a:lstStyle/>
+          <a:p>
+            <a:r>
+              <a:rPr lang="en-US" dirty="0"/>
+              <a:t>NULL</a:t>
+            </a:r>
+          </a:p>
+        </p:txBody>
+      </p:sp>
+      <p:sp>
+        <p:nvSpPr>
+          <p:cNvPr id="3" name="Content Placeholder 2">
+            <a:extLst>
+              <a:ext uri="{FF2B5EF4-FFF2-40B4-BE49-F238E27FC236}">
+                <a16:creationId xmlns:a16="http://schemas.microsoft.com/office/drawing/2014/main" id="{20C5DD16-1051-6B4F-AB21-2D417DDB2F7E}"/>
+              </a:ext>
+            </a:extLst>
+          </p:cNvPr>
+          <p:cNvSpPr>
+            <a:spLocks noGrp="1"/>
+          </p:cNvSpPr>
+          <p:nvPr>
+            <p:ph idx="1"/>
+          </p:nvPr>
+        </p:nvSpPr>
+        <p:spPr>
+          <a:xfrm>
+            <a:off x="1278565" y="1793728"/>
+            <a:ext cx="9634870" cy="4351338"/>
+          </a:xfrm>
+        </p:spPr>
+        <p:txBody>
+          <a:bodyPr/>
+          <a:lstStyle/>
+          <a:p>
+            <a:pPr marL="0" indent="0">
+              <a:buNone/>
+            </a:pPr>
+            <a:r>
+              <a:rPr lang="en-US" dirty="0"/>
+              <a:t>SQLite </a:t>
+            </a:r>
+            <a:r>
+              <a:rPr lang="en-US" b="1" dirty="0"/>
+              <a:t>NULL</a:t>
+            </a:r>
+            <a:r>
+              <a:rPr lang="en-US" dirty="0"/>
+              <a:t> is the term used to represent a missing value. A NULL value in a table is a value in a field that appears to be blank.</a:t>
+            </a:r>
+          </a:p>
+          <a:p>
+            <a:endParaRPr lang="en-US" dirty="0"/>
+          </a:p>
+          <a:p>
+            <a:pPr marL="0" indent="0">
+              <a:buNone/>
+            </a:pPr>
+            <a:r>
+              <a:rPr lang="en-US" dirty="0"/>
+              <a:t>A field with a NULL value is a field with no value. It is very important to understand that a NULL value is different than a zero value or a field that contains spaces.</a:t>
+            </a:r>
+          </a:p>
+          <a:p>
+            <a:pPr marL="0" indent="0">
+              <a:buNone/>
+            </a:pPr>
+            <a:endParaRPr lang="en-US" dirty="0"/>
+          </a:p>
+          <a:p>
+            <a:pPr marL="0" indent="0">
+              <a:buNone/>
+            </a:pPr>
+            <a:r>
+              <a:rPr lang="en-US" dirty="0"/>
+              <a:t>We’ll come back to this in our demos.</a:t>
+            </a:r>
+          </a:p>
+        </p:txBody>
+      </p:sp>
+    </p:spTree>
+    <p:extLst>
+      <p:ext uri="{BB962C8B-B14F-4D97-AF65-F5344CB8AC3E}">
+        <p14:creationId xmlns:p14="http://schemas.microsoft.com/office/powerpoint/2010/main" val="984932289"/>
+      </p:ext>
+    </p:extLst>
+  </p:cSld>
+  <p:clrMapOvr>
+    <a:masterClrMapping/>
+  </p:clrMapOvr>
+</p:sld>
+</file>
+
+<file path=ppt/slides/slide9.xml><?xml version="1.0" encoding="utf-8"?>
 <p:sld xmlns:a="http://schemas.openxmlformats.org/drawingml/2006/main" xmlns:r="http://schemas.openxmlformats.org/officeDocument/2006/relationships" xmlns:p="http://schemas.openxmlformats.org/presentationml/2006/main" showMasterPhAnim="0">
   <p:cSld>
     <p:spTree>
@@ -41511,529 +42164,6 @@
     </p:tnLst>
     <p:bldLst>
       <p:bldP spid="95235" grpId="0" build="p" autoUpdateAnimBg="0"/>
-    </p:bldLst>
-  </p:timing>
-</p:sld>
-</file>
-
-<file path=ppt/slides/slide9.xml><?xml version="1.0" encoding="utf-8"?>
-<p:sld xmlns:a="http://schemas.openxmlformats.org/drawingml/2006/main" xmlns:r="http://schemas.openxmlformats.org/officeDocument/2006/relationships" xmlns:p="http://schemas.openxmlformats.org/presentationml/2006/main">
-  <p:cSld>
-    <p:spTree>
-      <p:nvGrpSpPr>
-        <p:cNvPr id="1" name=""/>
-        <p:cNvGrpSpPr/>
-        <p:nvPr/>
-      </p:nvGrpSpPr>
-      <p:grpSpPr>
-        <a:xfrm>
-          <a:off x="0" y="0"/>
-          <a:ext cx="0" cy="0"/>
-          <a:chOff x="0" y="0"/>
-          <a:chExt cx="0" cy="0"/>
-        </a:xfrm>
-      </p:grpSpPr>
-      <p:sp>
-        <p:nvSpPr>
-          <p:cNvPr id="35841" name="Rectangle 2">
-            <a:extLst>
-              <a:ext uri="{FF2B5EF4-FFF2-40B4-BE49-F238E27FC236}">
-                <a16:creationId xmlns:a16="http://schemas.microsoft.com/office/drawing/2014/main" id="{07F80B2D-8960-1D43-84A6-E27E8D02F02D}"/>
-              </a:ext>
-            </a:extLst>
-          </p:cNvPr>
-          <p:cNvSpPr>
-            <a:spLocks noGrp="1" noChangeArrowheads="1"/>
-          </p:cNvSpPr>
-          <p:nvPr>
-            <p:ph type="title"/>
-          </p:nvPr>
-        </p:nvSpPr>
-        <p:spPr/>
-        <p:txBody>
-          <a:bodyPr>
-            <a:normAutofit/>
-          </a:bodyPr>
-          <a:lstStyle/>
-          <a:p>
-            <a:pPr eaLnBrk="1" hangingPunct="1"/>
-            <a:r>
-              <a:rPr lang="en-US" altLang="en-US" dirty="0">
-                <a:ea typeface="ＭＳ Ｐゴシック" panose="020B0600070205080204" pitchFamily="34" charset="-128"/>
-              </a:rPr>
-              <a:t>Integrity Constraints (ICs)</a:t>
-            </a:r>
-          </a:p>
-        </p:txBody>
-      </p:sp>
-      <p:sp>
-        <p:nvSpPr>
-          <p:cNvPr id="25605" name="Rectangle 3">
-            <a:extLst>
-              <a:ext uri="{FF2B5EF4-FFF2-40B4-BE49-F238E27FC236}">
-                <a16:creationId xmlns:a16="http://schemas.microsoft.com/office/drawing/2014/main" id="{78373FFB-248B-014C-A153-967951A94F97}"/>
-              </a:ext>
-            </a:extLst>
-          </p:cNvPr>
-          <p:cNvSpPr>
-            <a:spLocks noGrp="1" noChangeArrowheads="1"/>
-          </p:cNvSpPr>
-          <p:nvPr>
-            <p:ph type="body" idx="1"/>
-          </p:nvPr>
-        </p:nvSpPr>
-        <p:spPr>
-          <a:xfrm>
-            <a:off x="1905000" y="1605516"/>
-            <a:ext cx="8229600" cy="4114800"/>
-          </a:xfrm>
-        </p:spPr>
-        <p:txBody>
-          <a:bodyPr/>
-          <a:lstStyle/>
-          <a:p>
-            <a:pPr eaLnBrk="1" hangingPunct="1"/>
-            <a:r>
-              <a:rPr lang="en-US" altLang="en-US" b="1" dirty="0">
-                <a:latin typeface="Arial" panose="020B0604020202020204" pitchFamily="34" charset="0"/>
-                <a:ea typeface="ＭＳ Ｐゴシック" panose="020B0600070205080204" pitchFamily="34" charset="-128"/>
-              </a:rPr>
-              <a:t>IC</a:t>
-            </a:r>
-            <a:r>
-              <a:rPr lang="en-US" altLang="en-US" dirty="0">
-                <a:latin typeface="Arial" panose="020B0604020202020204" pitchFamily="34" charset="0"/>
-                <a:ea typeface="ＭＳ Ｐゴシック" panose="020B0600070205080204" pitchFamily="34" charset="-128"/>
-              </a:rPr>
-              <a:t>: condition that must be true for </a:t>
-            </a:r>
-            <a:r>
-              <a:rPr lang="en-US" altLang="en-US" i="1" dirty="0">
-                <a:latin typeface="Arial" panose="020B0604020202020204" pitchFamily="34" charset="0"/>
-                <a:ea typeface="ＭＳ Ｐゴシック" panose="020B0600070205080204" pitchFamily="34" charset="-128"/>
-              </a:rPr>
-              <a:t>any </a:t>
-            </a:r>
-            <a:r>
-              <a:rPr lang="en-US" altLang="en-US" dirty="0">
-                <a:latin typeface="Arial" panose="020B0604020202020204" pitchFamily="34" charset="0"/>
-                <a:ea typeface="ＭＳ Ｐゴシック" panose="020B0600070205080204" pitchFamily="34" charset="-128"/>
-              </a:rPr>
-              <a:t>instance of the database (e.g., domain constraints)</a:t>
-            </a:r>
-          </a:p>
-          <a:p>
-            <a:pPr lvl="1" eaLnBrk="1" hangingPunct="1">
-              <a:lnSpc>
-                <a:spcPct val="120000"/>
-              </a:lnSpc>
-            </a:pPr>
-            <a:r>
-              <a:rPr lang="en-US" altLang="en-US" dirty="0">
-                <a:latin typeface="Arial" panose="020B0604020202020204" pitchFamily="34" charset="0"/>
-                <a:ea typeface="ＭＳ Ｐゴシック" panose="020B0600070205080204" pitchFamily="34" charset="-128"/>
-              </a:rPr>
-              <a:t>A </a:t>
-            </a:r>
-            <a:r>
-              <a:rPr lang="en-US" altLang="en-US" b="1" dirty="0">
-                <a:latin typeface="Arial" panose="020B0604020202020204" pitchFamily="34" charset="0"/>
-                <a:ea typeface="ＭＳ Ｐゴシック" panose="020B0600070205080204" pitchFamily="34" charset="-128"/>
-              </a:rPr>
-              <a:t>legal</a:t>
-            </a:r>
-            <a:r>
-              <a:rPr lang="en-US" altLang="en-US" i="1" dirty="0">
-                <a:latin typeface="Arial" panose="020B0604020202020204" pitchFamily="34" charset="0"/>
-                <a:ea typeface="ＭＳ Ｐゴシック" panose="020B0600070205080204" pitchFamily="34" charset="-128"/>
-              </a:rPr>
-              <a:t> </a:t>
-            </a:r>
-            <a:r>
-              <a:rPr lang="en-US" altLang="en-US" dirty="0">
-                <a:latin typeface="Arial" panose="020B0604020202020204" pitchFamily="34" charset="0"/>
-                <a:ea typeface="ＭＳ Ｐゴシック" panose="020B0600070205080204" pitchFamily="34" charset="-128"/>
-              </a:rPr>
-              <a:t>instance of a relation is one that satisfies all specified ICs</a:t>
-            </a:r>
-          </a:p>
-          <a:p>
-            <a:pPr lvl="1" eaLnBrk="1" hangingPunct="1">
-              <a:lnSpc>
-                <a:spcPct val="120000"/>
-              </a:lnSpc>
-            </a:pPr>
-            <a:r>
-              <a:rPr lang="en-US" altLang="en-US" dirty="0">
-                <a:latin typeface="Arial" panose="020B0604020202020204" pitchFamily="34" charset="0"/>
-                <a:ea typeface="ＭＳ Ｐゴシック" panose="020B0600070205080204" pitchFamily="34" charset="-128"/>
-              </a:rPr>
-              <a:t>ICs are </a:t>
-            </a:r>
-            <a:r>
-              <a:rPr lang="en-US" altLang="en-US" u="sng" dirty="0">
-                <a:latin typeface="Arial" panose="020B0604020202020204" pitchFamily="34" charset="0"/>
-                <a:ea typeface="ＭＳ Ｐゴシック" panose="020B0600070205080204" pitchFamily="34" charset="-128"/>
-              </a:rPr>
-              <a:t>specified </a:t>
-            </a:r>
-            <a:r>
-              <a:rPr lang="en-US" altLang="en-US" dirty="0">
-                <a:latin typeface="Arial" panose="020B0604020202020204" pitchFamily="34" charset="0"/>
-                <a:ea typeface="ＭＳ Ｐゴシック" panose="020B0600070205080204" pitchFamily="34" charset="-128"/>
-              </a:rPr>
-              <a:t>when schema is </a:t>
-            </a:r>
-            <a:r>
-              <a:rPr lang="en-US" altLang="en-US" b="1" dirty="0">
-                <a:latin typeface="Arial" panose="020B0604020202020204" pitchFamily="34" charset="0"/>
-                <a:ea typeface="ＭＳ Ｐゴシック" panose="020B0600070205080204" pitchFamily="34" charset="-128"/>
-              </a:rPr>
-              <a:t>defined</a:t>
-            </a:r>
-          </a:p>
-          <a:p>
-            <a:pPr lvl="1" eaLnBrk="1" hangingPunct="1">
-              <a:lnSpc>
-                <a:spcPct val="120000"/>
-              </a:lnSpc>
-            </a:pPr>
-            <a:r>
-              <a:rPr lang="en-US" altLang="en-US" dirty="0">
-                <a:latin typeface="Arial" panose="020B0604020202020204" pitchFamily="34" charset="0"/>
-                <a:ea typeface="ＭＳ Ｐゴシック" panose="020B0600070205080204" pitchFamily="34" charset="-128"/>
-              </a:rPr>
-              <a:t>ICs are </a:t>
-            </a:r>
-            <a:r>
-              <a:rPr lang="en-US" altLang="en-US" u="sng" dirty="0">
-                <a:latin typeface="Arial" panose="020B0604020202020204" pitchFamily="34" charset="0"/>
-                <a:ea typeface="ＭＳ Ｐゴシック" panose="020B0600070205080204" pitchFamily="34" charset="-128"/>
-              </a:rPr>
-              <a:t>enforced </a:t>
-            </a:r>
-            <a:r>
-              <a:rPr lang="en-US" altLang="en-US" dirty="0">
-                <a:latin typeface="Arial" panose="020B0604020202020204" pitchFamily="34" charset="0"/>
-                <a:ea typeface="ＭＳ Ｐゴシック" panose="020B0600070205080204" pitchFamily="34" charset="-128"/>
-              </a:rPr>
-              <a:t>when tables are </a:t>
-            </a:r>
-            <a:r>
-              <a:rPr lang="en-US" altLang="en-US" b="1" dirty="0">
-                <a:latin typeface="Arial" panose="020B0604020202020204" pitchFamily="34" charset="0"/>
-                <a:ea typeface="ＭＳ Ｐゴシック" panose="020B0600070205080204" pitchFamily="34" charset="-128"/>
-              </a:rPr>
-              <a:t>modified</a:t>
-            </a:r>
-          </a:p>
-          <a:p>
-            <a:pPr lvl="1" eaLnBrk="1" hangingPunct="1"/>
-            <a:endParaRPr lang="en-US" altLang="en-US" dirty="0">
-              <a:latin typeface="Arial" panose="020B0604020202020204" pitchFamily="34" charset="0"/>
-              <a:ea typeface="ＭＳ Ｐゴシック" panose="020B0600070205080204" pitchFamily="34" charset="-128"/>
-            </a:endParaRPr>
-          </a:p>
-        </p:txBody>
-      </p:sp>
-      <p:pic>
-        <p:nvPicPr>
-          <p:cNvPr id="35843" name="Picture 6">
-            <a:extLst>
-              <a:ext uri="{FF2B5EF4-FFF2-40B4-BE49-F238E27FC236}">
-                <a16:creationId xmlns:a16="http://schemas.microsoft.com/office/drawing/2014/main" id="{95D39001-AF97-6D40-A735-F9539DA2EDDA}"/>
-              </a:ext>
-            </a:extLst>
-          </p:cNvPr>
-          <p:cNvPicPr>
-            <a:picLocks noChangeAspect="1"/>
-          </p:cNvPicPr>
-          <p:nvPr/>
-        </p:nvPicPr>
-        <p:blipFill>
-          <a:blip r:embed="rId2">
-            <a:extLst>
-              <a:ext uri="{28A0092B-C50C-407E-A947-70E740481C1C}">
-                <a14:useLocalDpi xmlns:a14="http://schemas.microsoft.com/office/drawing/2010/main" val="0"/>
-              </a:ext>
-            </a:extLst>
-          </a:blip>
-          <a:srcRect/>
-          <a:stretch>
-            <a:fillRect/>
-          </a:stretch>
-        </p:blipFill>
-        <p:spPr bwMode="auto">
-          <a:xfrm>
-            <a:off x="7421564" y="4729716"/>
-            <a:ext cx="2865437" cy="1524000"/>
-          </a:xfrm>
-          <a:prstGeom prst="rect">
-            <a:avLst/>
-          </a:prstGeom>
-          <a:noFill/>
-          <a:ln>
-            <a:noFill/>
-          </a:ln>
-          <a:extLst>
-            <a:ext uri="{909E8E84-426E-40DD-AFC4-6F175D3DCCD1}">
-              <a14:hiddenFill xmlns:a14="http://schemas.microsoft.com/office/drawing/2010/main">
-                <a:solidFill>
-                  <a:srgbClr val="FFFFFF"/>
-                </a:solidFill>
-              </a14:hiddenFill>
-            </a:ext>
-            <a:ext uri="{91240B29-F687-4F45-9708-019B960494DF}">
-              <a14:hiddenLine xmlns:a14="http://schemas.microsoft.com/office/drawing/2010/main" w="9525">
-                <a:solidFill>
-                  <a:srgbClr val="000000"/>
-                </a:solidFill>
-                <a:miter lim="800000"/>
-                <a:headEnd/>
-                <a:tailEnd/>
-              </a14:hiddenLine>
-            </a:ext>
-          </a:extLst>
-        </p:spPr>
-      </p:pic>
-    </p:spTree>
-    <p:extLst>
-      <p:ext uri="{BB962C8B-B14F-4D97-AF65-F5344CB8AC3E}">
-        <p14:creationId xmlns:p14="http://schemas.microsoft.com/office/powerpoint/2010/main" val="3686999695"/>
-      </p:ext>
-    </p:extLst>
-  </p:cSld>
-  <p:clrMapOvr>
-    <a:masterClrMapping/>
-  </p:clrMapOvr>
-  <p:transition spd="slow"/>
-  <p:timing>
-    <p:tnLst>
-      <p:par>
-        <p:cTn id="1" dur="indefinite" restart="never" nodeType="tmRoot">
-          <p:childTnLst>
-            <p:seq concurrent="1" nextAc="seek">
-              <p:cTn id="2" dur="indefinite" nodeType="mainSeq">
-                <p:childTnLst>
-                  <p:par>
-                    <p:cTn id="3" fill="hold" nodeType="clickPar">
-                      <p:stCondLst>
-                        <p:cond delay="indefinite"/>
-                      </p:stCondLst>
-                      <p:childTnLst>
-                        <p:par>
-                          <p:cTn id="4" fill="hold" nodeType="withGroup">
-                            <p:stCondLst>
-                              <p:cond delay="0"/>
-                            </p:stCondLst>
-                            <p:childTnLst>
-                              <p:par>
-                                <p:cTn id="5" presetID="1" presetClass="entr" presetSubtype="0" fill="hold" grpId="0" nodeType="clickEffect">
-                                  <p:stCondLst>
-                                    <p:cond delay="0"/>
-                                  </p:stCondLst>
-                                  <p:childTnLst>
-                                    <p:set>
-                                      <p:cBhvr>
-                                        <p:cTn id="6" dur="1" fill="hold">
-                                          <p:stCondLst>
-                                            <p:cond delay="0"/>
-                                          </p:stCondLst>
-                                        </p:cTn>
-                                        <p:tgtEl>
-                                          <p:spTgt spid="25605">
-                                            <p:txEl>
-                                              <p:pRg st="0" end="0"/>
-                                            </p:txEl>
-                                          </p:spTgt>
-                                        </p:tgtEl>
-                                        <p:attrNameLst>
-                                          <p:attrName>style.visibility</p:attrName>
-                                        </p:attrNameLst>
-                                      </p:cBhvr>
-                                      <p:to>
-                                        <p:strVal val="visible"/>
-                                      </p:to>
-                                    </p:set>
-                                  </p:childTnLst>
-                                </p:cTn>
-                              </p:par>
-                            </p:childTnLst>
-                          </p:cTn>
-                        </p:par>
-                      </p:childTnLst>
-                    </p:cTn>
-                  </p:par>
-                  <p:par>
-                    <p:cTn id="7" fill="hold" nodeType="clickPar">
-                      <p:stCondLst>
-                        <p:cond delay="indefinite"/>
-                      </p:stCondLst>
-                      <p:childTnLst>
-                        <p:par>
-                          <p:cTn id="8" fill="hold" nodeType="withGroup">
-                            <p:stCondLst>
-                              <p:cond delay="0"/>
-                            </p:stCondLst>
-                            <p:childTnLst>
-                              <p:par>
-                                <p:cTn id="9" presetID="1" presetClass="entr" presetSubtype="0" fill="hold" grpId="0" nodeType="clickEffect">
-                                  <p:stCondLst>
-                                    <p:cond delay="0"/>
-                                  </p:stCondLst>
-                                  <p:childTnLst>
-                                    <p:set>
-                                      <p:cBhvr>
-                                        <p:cTn id="10" dur="1" fill="hold">
-                                          <p:stCondLst>
-                                            <p:cond delay="0"/>
-                                          </p:stCondLst>
-                                        </p:cTn>
-                                        <p:tgtEl>
-                                          <p:spTgt spid="25605">
-                                            <p:txEl>
-                                              <p:pRg st="1" end="1"/>
-                                            </p:txEl>
-                                          </p:spTgt>
-                                        </p:tgtEl>
-                                        <p:attrNameLst>
-                                          <p:attrName>style.visibility</p:attrName>
-                                        </p:attrNameLst>
-                                      </p:cBhvr>
-                                      <p:to>
-                                        <p:strVal val="visible"/>
-                                      </p:to>
-                                    </p:set>
-                                  </p:childTnLst>
-                                </p:cTn>
-                              </p:par>
-                            </p:childTnLst>
-                          </p:cTn>
-                        </p:par>
-                      </p:childTnLst>
-                    </p:cTn>
-                  </p:par>
-                  <p:par>
-                    <p:cTn id="11" fill="hold" nodeType="clickPar">
-                      <p:stCondLst>
-                        <p:cond delay="indefinite"/>
-                      </p:stCondLst>
-                      <p:childTnLst>
-                        <p:par>
-                          <p:cTn id="12" fill="hold" nodeType="withGroup">
-                            <p:stCondLst>
-                              <p:cond delay="0"/>
-                            </p:stCondLst>
-                            <p:childTnLst>
-                              <p:par>
-                                <p:cTn id="13" presetID="1" presetClass="entr" presetSubtype="0" fill="hold" grpId="0" nodeType="clickEffect">
-                                  <p:stCondLst>
-                                    <p:cond delay="0"/>
-                                  </p:stCondLst>
-                                  <p:childTnLst>
-                                    <p:set>
-                                      <p:cBhvr>
-                                        <p:cTn id="14" dur="1" fill="hold">
-                                          <p:stCondLst>
-                                            <p:cond delay="0"/>
-                                          </p:stCondLst>
-                                        </p:cTn>
-                                        <p:tgtEl>
-                                          <p:spTgt spid="25605">
-                                            <p:txEl>
-                                              <p:pRg st="2" end="2"/>
-                                            </p:txEl>
-                                          </p:spTgt>
-                                        </p:tgtEl>
-                                        <p:attrNameLst>
-                                          <p:attrName>style.visibility</p:attrName>
-                                        </p:attrNameLst>
-                                      </p:cBhvr>
-                                      <p:to>
-                                        <p:strVal val="visible"/>
-                                      </p:to>
-                                    </p:set>
-                                  </p:childTnLst>
-                                </p:cTn>
-                              </p:par>
-                            </p:childTnLst>
-                          </p:cTn>
-                        </p:par>
-                      </p:childTnLst>
-                    </p:cTn>
-                  </p:par>
-                  <p:par>
-                    <p:cTn id="15" fill="hold" nodeType="clickPar">
-                      <p:stCondLst>
-                        <p:cond delay="indefinite"/>
-                      </p:stCondLst>
-                      <p:childTnLst>
-                        <p:par>
-                          <p:cTn id="16" fill="hold" nodeType="withGroup">
-                            <p:stCondLst>
-                              <p:cond delay="0"/>
-                            </p:stCondLst>
-                            <p:childTnLst>
-                              <p:par>
-                                <p:cTn id="17" presetID="1" presetClass="entr" presetSubtype="0" fill="hold" grpId="0" nodeType="clickEffect">
-                                  <p:stCondLst>
-                                    <p:cond delay="0"/>
-                                  </p:stCondLst>
-                                  <p:childTnLst>
-                                    <p:set>
-                                      <p:cBhvr>
-                                        <p:cTn id="18" dur="1" fill="hold">
-                                          <p:stCondLst>
-                                            <p:cond delay="0"/>
-                                          </p:stCondLst>
-                                        </p:cTn>
-                                        <p:tgtEl>
-                                          <p:spTgt spid="25605">
-                                            <p:txEl>
-                                              <p:pRg st="3" end="3"/>
-                                            </p:txEl>
-                                          </p:spTgt>
-                                        </p:tgtEl>
-                                        <p:attrNameLst>
-                                          <p:attrName>style.visibility</p:attrName>
-                                        </p:attrNameLst>
-                                      </p:cBhvr>
-                                      <p:to>
-                                        <p:strVal val="visible"/>
-                                      </p:to>
-                                    </p:set>
-                                  </p:childTnLst>
-                                </p:cTn>
-                              </p:par>
-                            </p:childTnLst>
-                          </p:cTn>
-                        </p:par>
-                      </p:childTnLst>
-                    </p:cTn>
-                  </p:par>
-                </p:childTnLst>
-              </p:cTn>
-              <p:prevCondLst>
-                <p:cond evt="onPrev" delay="0">
-                  <p:tgtEl>
-                    <p:sldTgt/>
-                  </p:tgtEl>
-                </p:cond>
-              </p:prevCondLst>
-              <p:nextCondLst>
-                <p:cond evt="onNext" delay="0">
-                  <p:tgtEl>
-                    <p:sldTgt/>
-                  </p:tgtEl>
-                </p:cond>
-              </p:nextCondLst>
-            </p:seq>
-          </p:childTnLst>
-        </p:cTn>
-      </p:par>
-    </p:tnLst>
-    <p:bldLst>
-      <p:bldP spid="25605" grpId="0" build="p" bldLvl="2"/>
     </p:bldLst>
   </p:timing>
 </p:sld>

</xml_diff>